<commit_message>
Chap05: Only 2 pictures remaining: pumping exp schema and probe away from the dots. Caption to do in today's pictures.
</commit_message>
<xml_diff>
--- a/05-CrDyn/Pictures/AutocorPeaks.pptx
+++ b/05-CrDyn/Pictures/AutocorPeaks.pptx
@@ -7,14 +7,14 @@
   <p:sldIdLst>
     <p:sldId id="256" r:id="rId2"/>
   </p:sldIdLst>
-  <p:sldSz cx="4968875" cy="9001125"/>
+  <p:sldSz cx="3852863" cy="7021513"/>
   <p:notesSz cx="6858000" cy="9144000"/>
   <p:defaultTextStyle>
     <a:defPPr>
       <a:defRPr lang="fr-FR"/>
     </a:defPPr>
-    <a:lvl1pPr marL="0" algn="l" defTabSz="1080130" rtl="0" eaLnBrk="1" latinLnBrk="0" hangingPunct="1">
-      <a:defRPr sz="2200" kern="1200">
+    <a:lvl1pPr marL="0" algn="l" defTabSz="849021" rtl="0" eaLnBrk="1" latinLnBrk="0" hangingPunct="1">
+      <a:defRPr sz="1700" kern="1200">
         <a:solidFill>
           <a:schemeClr val="tx1"/>
         </a:solidFill>
@@ -23,8 +23,8 @@
         <a:cs typeface="+mn-cs"/>
       </a:defRPr>
     </a:lvl1pPr>
-    <a:lvl2pPr marL="540064" algn="l" defTabSz="1080130" rtl="0" eaLnBrk="1" latinLnBrk="0" hangingPunct="1">
-      <a:defRPr sz="2200" kern="1200">
+    <a:lvl2pPr marL="424510" algn="l" defTabSz="849021" rtl="0" eaLnBrk="1" latinLnBrk="0" hangingPunct="1">
+      <a:defRPr sz="1700" kern="1200">
         <a:solidFill>
           <a:schemeClr val="tx1"/>
         </a:solidFill>
@@ -33,8 +33,8 @@
         <a:cs typeface="+mn-cs"/>
       </a:defRPr>
     </a:lvl2pPr>
-    <a:lvl3pPr marL="1080130" algn="l" defTabSz="1080130" rtl="0" eaLnBrk="1" latinLnBrk="0" hangingPunct="1">
-      <a:defRPr sz="2200" kern="1200">
+    <a:lvl3pPr marL="849021" algn="l" defTabSz="849021" rtl="0" eaLnBrk="1" latinLnBrk="0" hangingPunct="1">
+      <a:defRPr sz="1700" kern="1200">
         <a:solidFill>
           <a:schemeClr val="tx1"/>
         </a:solidFill>
@@ -43,8 +43,8 @@
         <a:cs typeface="+mn-cs"/>
       </a:defRPr>
     </a:lvl3pPr>
-    <a:lvl4pPr marL="1620194" algn="l" defTabSz="1080130" rtl="0" eaLnBrk="1" latinLnBrk="0" hangingPunct="1">
-      <a:defRPr sz="2200" kern="1200">
+    <a:lvl4pPr marL="1273532" algn="l" defTabSz="849021" rtl="0" eaLnBrk="1" latinLnBrk="0" hangingPunct="1">
+      <a:defRPr sz="1700" kern="1200">
         <a:solidFill>
           <a:schemeClr val="tx1"/>
         </a:solidFill>
@@ -53,8 +53,8 @@
         <a:cs typeface="+mn-cs"/>
       </a:defRPr>
     </a:lvl4pPr>
-    <a:lvl5pPr marL="2160259" algn="l" defTabSz="1080130" rtl="0" eaLnBrk="1" latinLnBrk="0" hangingPunct="1">
-      <a:defRPr sz="2200" kern="1200">
+    <a:lvl5pPr marL="1698043" algn="l" defTabSz="849021" rtl="0" eaLnBrk="1" latinLnBrk="0" hangingPunct="1">
+      <a:defRPr sz="1700" kern="1200">
         <a:solidFill>
           <a:schemeClr val="tx1"/>
         </a:solidFill>
@@ -63,8 +63,8 @@
         <a:cs typeface="+mn-cs"/>
       </a:defRPr>
     </a:lvl5pPr>
-    <a:lvl6pPr marL="2700324" algn="l" defTabSz="1080130" rtl="0" eaLnBrk="1" latinLnBrk="0" hangingPunct="1">
-      <a:defRPr sz="2200" kern="1200">
+    <a:lvl6pPr marL="2122553" algn="l" defTabSz="849021" rtl="0" eaLnBrk="1" latinLnBrk="0" hangingPunct="1">
+      <a:defRPr sz="1700" kern="1200">
         <a:solidFill>
           <a:schemeClr val="tx1"/>
         </a:solidFill>
@@ -73,8 +73,8 @@
         <a:cs typeface="+mn-cs"/>
       </a:defRPr>
     </a:lvl6pPr>
-    <a:lvl7pPr marL="3240388" algn="l" defTabSz="1080130" rtl="0" eaLnBrk="1" latinLnBrk="0" hangingPunct="1">
-      <a:defRPr sz="2200" kern="1200">
+    <a:lvl7pPr marL="2547063" algn="l" defTabSz="849021" rtl="0" eaLnBrk="1" latinLnBrk="0" hangingPunct="1">
+      <a:defRPr sz="1700" kern="1200">
         <a:solidFill>
           <a:schemeClr val="tx1"/>
         </a:solidFill>
@@ -83,8 +83,8 @@
         <a:cs typeface="+mn-cs"/>
       </a:defRPr>
     </a:lvl7pPr>
-    <a:lvl8pPr marL="3780453" algn="l" defTabSz="1080130" rtl="0" eaLnBrk="1" latinLnBrk="0" hangingPunct="1">
-      <a:defRPr sz="2200" kern="1200">
+    <a:lvl8pPr marL="2971574" algn="l" defTabSz="849021" rtl="0" eaLnBrk="1" latinLnBrk="0" hangingPunct="1">
+      <a:defRPr sz="1700" kern="1200">
         <a:solidFill>
           <a:schemeClr val="tx1"/>
         </a:solidFill>
@@ -93,8 +93,8 @@
         <a:cs typeface="+mn-cs"/>
       </a:defRPr>
     </a:lvl8pPr>
-    <a:lvl9pPr marL="4320517" algn="l" defTabSz="1080130" rtl="0" eaLnBrk="1" latinLnBrk="0" hangingPunct="1">
-      <a:defRPr sz="2200" kern="1200">
+    <a:lvl9pPr marL="3396083" algn="l" defTabSz="849021" rtl="0" eaLnBrk="1" latinLnBrk="0" hangingPunct="1">
+      <a:defRPr sz="1700" kern="1200">
         <a:solidFill>
           <a:schemeClr val="tx1"/>
         </a:solidFill>
@@ -136,8 +136,8 @@
         </p:nvSpPr>
         <p:spPr>
           <a:xfrm>
-            <a:off x="372666" y="2796189"/>
-            <a:ext cx="4223543" cy="1929407"/>
+            <a:off x="288965" y="2181225"/>
+            <a:ext cx="3274933" cy="1505074"/>
           </a:xfrm>
         </p:spPr>
         <p:txBody>
@@ -164,8 +164,8 @@
         </p:nvSpPr>
         <p:spPr>
           <a:xfrm>
-            <a:off x="745332" y="5100642"/>
-            <a:ext cx="3478213" cy="2300287"/>
+            <a:off x="577931" y="3978861"/>
+            <a:ext cx="2697003" cy="1794386"/>
           </a:xfrm>
         </p:spPr>
         <p:txBody>
@@ -181,7 +181,7 @@
                 </a:solidFill>
               </a:defRPr>
             </a:lvl1pPr>
-            <a:lvl2pPr marL="540064" indent="0" algn="ctr">
+            <a:lvl2pPr marL="424510" indent="0" algn="ctr">
               <a:buNone/>
               <a:defRPr>
                 <a:solidFill>
@@ -191,7 +191,7 @@
                 </a:solidFill>
               </a:defRPr>
             </a:lvl2pPr>
-            <a:lvl3pPr marL="1080130" indent="0" algn="ctr">
+            <a:lvl3pPr marL="849021" indent="0" algn="ctr">
               <a:buNone/>
               <a:defRPr>
                 <a:solidFill>
@@ -201,7 +201,7 @@
                 </a:solidFill>
               </a:defRPr>
             </a:lvl3pPr>
-            <a:lvl4pPr marL="1620194" indent="0" algn="ctr">
+            <a:lvl4pPr marL="1273532" indent="0" algn="ctr">
               <a:buNone/>
               <a:defRPr>
                 <a:solidFill>
@@ -211,7 +211,7 @@
                 </a:solidFill>
               </a:defRPr>
             </a:lvl4pPr>
-            <a:lvl5pPr marL="2160259" indent="0" algn="ctr">
+            <a:lvl5pPr marL="1698043" indent="0" algn="ctr">
               <a:buNone/>
               <a:defRPr>
                 <a:solidFill>
@@ -221,7 +221,7 @@
                 </a:solidFill>
               </a:defRPr>
             </a:lvl5pPr>
-            <a:lvl6pPr marL="2700324" indent="0" algn="ctr">
+            <a:lvl6pPr marL="2122553" indent="0" algn="ctr">
               <a:buNone/>
               <a:defRPr>
                 <a:solidFill>
@@ -231,7 +231,7 @@
                 </a:solidFill>
               </a:defRPr>
             </a:lvl6pPr>
-            <a:lvl7pPr marL="3240388" indent="0" algn="ctr">
+            <a:lvl7pPr marL="2547063" indent="0" algn="ctr">
               <a:buNone/>
               <a:defRPr>
                 <a:solidFill>
@@ -241,7 +241,7 @@
                 </a:solidFill>
               </a:defRPr>
             </a:lvl7pPr>
-            <a:lvl8pPr marL="3780453" indent="0" algn="ctr">
+            <a:lvl8pPr marL="2971574" indent="0" algn="ctr">
               <a:buNone/>
               <a:defRPr>
                 <a:solidFill>
@@ -251,7 +251,7 @@
                 </a:solidFill>
               </a:defRPr>
             </a:lvl8pPr>
-            <a:lvl9pPr marL="4320517" indent="0" algn="ctr">
+            <a:lvl9pPr marL="3396083" indent="0" algn="ctr">
               <a:buNone/>
               <a:defRPr>
                 <a:solidFill>
@@ -288,7 +288,7 @@
           <a:p>
             <a:fld id="{631F3B9D-D187-4196-BC59-C5BAE8C8D526}" type="datetimeFigureOut">
               <a:rPr lang="fr-FR" smtClean="0"/>
-              <a:t>22/06/2017</a:t>
+              <a:t>29/06/2017</a:t>
             </a:fld>
             <a:endParaRPr lang="fr-FR"/>
           </a:p>
@@ -458,7 +458,7 @@
           <a:p>
             <a:fld id="{631F3B9D-D187-4196-BC59-C5BAE8C8D526}" type="datetimeFigureOut">
               <a:rPr lang="fr-FR" smtClean="0"/>
-              <a:t>22/06/2017</a:t>
+              <a:t>29/06/2017</a:t>
             </a:fld>
             <a:endParaRPr lang="fr-FR"/>
           </a:p>
@@ -548,8 +548,8 @@
         </p:nvSpPr>
         <p:spPr>
           <a:xfrm>
-            <a:off x="3602436" y="360467"/>
-            <a:ext cx="1117997" cy="7680127"/>
+            <a:off x="2793330" y="281194"/>
+            <a:ext cx="866894" cy="5991041"/>
           </a:xfrm>
         </p:spPr>
         <p:txBody>
@@ -576,8 +576,8 @@
         </p:nvSpPr>
         <p:spPr>
           <a:xfrm>
-            <a:off x="248444" y="360467"/>
-            <a:ext cx="3271176" cy="7680127"/>
+            <a:off x="192647" y="281194"/>
+            <a:ext cx="2536468" cy="5991041"/>
           </a:xfrm>
         </p:spPr>
         <p:txBody>
@@ -638,7 +638,7 @@
           <a:p>
             <a:fld id="{631F3B9D-D187-4196-BC59-C5BAE8C8D526}" type="datetimeFigureOut">
               <a:rPr lang="fr-FR" smtClean="0"/>
-              <a:t>22/06/2017</a:t>
+              <a:t>29/06/2017</a:t>
             </a:fld>
             <a:endParaRPr lang="fr-FR"/>
           </a:p>
@@ -808,7 +808,7 @@
           <a:p>
             <a:fld id="{631F3B9D-D187-4196-BC59-C5BAE8C8D526}" type="datetimeFigureOut">
               <a:rPr lang="fr-FR" smtClean="0"/>
-              <a:t>22/06/2017</a:t>
+              <a:t>29/06/2017</a:t>
             </a:fld>
             <a:endParaRPr lang="fr-FR"/>
           </a:p>
@@ -898,15 +898,15 @@
         </p:nvSpPr>
         <p:spPr>
           <a:xfrm>
-            <a:off x="392508" y="5784056"/>
-            <a:ext cx="4223543" cy="1787724"/>
+            <a:off x="304351" y="4511976"/>
+            <a:ext cx="3274933" cy="1394551"/>
           </a:xfrm>
         </p:spPr>
         <p:txBody>
           <a:bodyPr anchor="t"/>
           <a:lstStyle>
             <a:lvl1pPr algn="l">
-              <a:defRPr sz="4800" b="1" cap="all"/>
+              <a:defRPr sz="3800" b="1" cap="all"/>
             </a:lvl1pPr>
           </a:lstStyle>
           <a:p>
@@ -930,8 +930,8 @@
         </p:nvSpPr>
         <p:spPr>
           <a:xfrm>
-            <a:off x="392508" y="3815067"/>
-            <a:ext cx="4223543" cy="1968995"/>
+            <a:off x="304351" y="2976024"/>
+            <a:ext cx="3274933" cy="1535955"/>
           </a:xfrm>
         </p:spPr>
         <p:txBody>
@@ -939,7 +939,7 @@
           <a:lstStyle>
             <a:lvl1pPr marL="0" indent="0">
               <a:buNone/>
-              <a:defRPr sz="2300">
+              <a:defRPr sz="1800">
                 <a:solidFill>
                   <a:schemeClr val="tx1">
                     <a:tint val="75000"/>
@@ -947,9 +947,9 @@
                 </a:solidFill>
               </a:defRPr>
             </a:lvl1pPr>
-            <a:lvl2pPr marL="540064" indent="0">
-              <a:buNone/>
-              <a:defRPr sz="2200">
+            <a:lvl2pPr marL="424510" indent="0">
+              <a:buNone/>
+              <a:defRPr sz="1700">
                 <a:solidFill>
                   <a:schemeClr val="tx1">
                     <a:tint val="75000"/>
@@ -957,9 +957,9 @@
                 </a:solidFill>
               </a:defRPr>
             </a:lvl2pPr>
-            <a:lvl3pPr marL="1080130" indent="0">
-              <a:buNone/>
-              <a:defRPr sz="1900">
+            <a:lvl3pPr marL="849021" indent="0">
+              <a:buNone/>
+              <a:defRPr sz="1500">
                 <a:solidFill>
                   <a:schemeClr val="tx1">
                     <a:tint val="75000"/>
@@ -967,9 +967,9 @@
                 </a:solidFill>
               </a:defRPr>
             </a:lvl3pPr>
-            <a:lvl4pPr marL="1620194" indent="0">
-              <a:buNone/>
-              <a:defRPr sz="1700">
+            <a:lvl4pPr marL="1273532" indent="0">
+              <a:buNone/>
+              <a:defRPr sz="1300">
                 <a:solidFill>
                   <a:schemeClr val="tx1">
                     <a:tint val="75000"/>
@@ -977,9 +977,9 @@
                 </a:solidFill>
               </a:defRPr>
             </a:lvl4pPr>
-            <a:lvl5pPr marL="2160259" indent="0">
-              <a:buNone/>
-              <a:defRPr sz="1700">
+            <a:lvl5pPr marL="1698043" indent="0">
+              <a:buNone/>
+              <a:defRPr sz="1300">
                 <a:solidFill>
                   <a:schemeClr val="tx1">
                     <a:tint val="75000"/>
@@ -987,9 +987,9 @@
                 </a:solidFill>
               </a:defRPr>
             </a:lvl5pPr>
-            <a:lvl6pPr marL="2700324" indent="0">
-              <a:buNone/>
-              <a:defRPr sz="1700">
+            <a:lvl6pPr marL="2122553" indent="0">
+              <a:buNone/>
+              <a:defRPr sz="1300">
                 <a:solidFill>
                   <a:schemeClr val="tx1">
                     <a:tint val="75000"/>
@@ -997,9 +997,9 @@
                 </a:solidFill>
               </a:defRPr>
             </a:lvl6pPr>
-            <a:lvl7pPr marL="3240388" indent="0">
-              <a:buNone/>
-              <a:defRPr sz="1700">
+            <a:lvl7pPr marL="2547063" indent="0">
+              <a:buNone/>
+              <a:defRPr sz="1300">
                 <a:solidFill>
                   <a:schemeClr val="tx1">
                     <a:tint val="75000"/>
@@ -1007,9 +1007,9 @@
                 </a:solidFill>
               </a:defRPr>
             </a:lvl7pPr>
-            <a:lvl8pPr marL="3780453" indent="0">
-              <a:buNone/>
-              <a:defRPr sz="1700">
+            <a:lvl8pPr marL="2971574" indent="0">
+              <a:buNone/>
+              <a:defRPr sz="1300">
                 <a:solidFill>
                   <a:schemeClr val="tx1">
                     <a:tint val="75000"/>
@@ -1017,9 +1017,9 @@
                 </a:solidFill>
               </a:defRPr>
             </a:lvl8pPr>
-            <a:lvl9pPr marL="4320517" indent="0">
-              <a:buNone/>
-              <a:defRPr sz="1700">
+            <a:lvl9pPr marL="3396083" indent="0">
+              <a:buNone/>
+              <a:defRPr sz="1300">
                 <a:solidFill>
                   <a:schemeClr val="tx1">
                     <a:tint val="75000"/>
@@ -1054,7 +1054,7 @@
           <a:p>
             <a:fld id="{631F3B9D-D187-4196-BC59-C5BAE8C8D526}" type="datetimeFigureOut">
               <a:rPr lang="fr-FR" smtClean="0"/>
-              <a:t>22/06/2017</a:t>
+              <a:t>29/06/2017</a:t>
             </a:fld>
             <a:endParaRPr lang="fr-FR"/>
           </a:p>
@@ -1167,39 +1167,39 @@
         </p:nvSpPr>
         <p:spPr>
           <a:xfrm>
-            <a:off x="248446" y="2100266"/>
-            <a:ext cx="2194586" cy="5940326"/>
+            <a:off x="192646" y="1638356"/>
+            <a:ext cx="1701681" cy="4633874"/>
           </a:xfrm>
         </p:spPr>
         <p:txBody>
           <a:bodyPr/>
           <a:lstStyle>
             <a:lvl1pPr>
-              <a:defRPr sz="3400"/>
+              <a:defRPr sz="2700"/>
             </a:lvl1pPr>
             <a:lvl2pPr>
-              <a:defRPr sz="2800"/>
+              <a:defRPr sz="2200"/>
             </a:lvl2pPr>
             <a:lvl3pPr>
-              <a:defRPr sz="2300"/>
+              <a:defRPr sz="1800"/>
             </a:lvl3pPr>
             <a:lvl4pPr>
-              <a:defRPr sz="2200"/>
+              <a:defRPr sz="1700"/>
             </a:lvl4pPr>
             <a:lvl5pPr>
-              <a:defRPr sz="2200"/>
+              <a:defRPr sz="1700"/>
             </a:lvl5pPr>
             <a:lvl6pPr>
-              <a:defRPr sz="2200"/>
+              <a:defRPr sz="1700"/>
             </a:lvl6pPr>
             <a:lvl7pPr>
-              <a:defRPr sz="2200"/>
+              <a:defRPr sz="1700"/>
             </a:lvl7pPr>
             <a:lvl8pPr>
-              <a:defRPr sz="2200"/>
+              <a:defRPr sz="1700"/>
             </a:lvl8pPr>
             <a:lvl9pPr>
-              <a:defRPr sz="2200"/>
+              <a:defRPr sz="1700"/>
             </a:lvl9pPr>
           </a:lstStyle>
           <a:p>
@@ -1252,39 +1252,39 @@
         </p:nvSpPr>
         <p:spPr>
           <a:xfrm>
-            <a:off x="2525849" y="2100266"/>
-            <a:ext cx="2194586" cy="5940326"/>
+            <a:off x="1958542" y="1638356"/>
+            <a:ext cx="1701681" cy="4633874"/>
           </a:xfrm>
         </p:spPr>
         <p:txBody>
           <a:bodyPr/>
           <a:lstStyle>
             <a:lvl1pPr>
-              <a:defRPr sz="3400"/>
+              <a:defRPr sz="2700"/>
             </a:lvl1pPr>
             <a:lvl2pPr>
-              <a:defRPr sz="2800"/>
+              <a:defRPr sz="2200"/>
             </a:lvl2pPr>
             <a:lvl3pPr>
-              <a:defRPr sz="2300"/>
+              <a:defRPr sz="1800"/>
             </a:lvl3pPr>
             <a:lvl4pPr>
-              <a:defRPr sz="2200"/>
+              <a:defRPr sz="1700"/>
             </a:lvl4pPr>
             <a:lvl5pPr>
-              <a:defRPr sz="2200"/>
+              <a:defRPr sz="1700"/>
             </a:lvl5pPr>
             <a:lvl6pPr>
-              <a:defRPr sz="2200"/>
+              <a:defRPr sz="1700"/>
             </a:lvl6pPr>
             <a:lvl7pPr>
-              <a:defRPr sz="2200"/>
+              <a:defRPr sz="1700"/>
             </a:lvl7pPr>
             <a:lvl8pPr>
-              <a:defRPr sz="2200"/>
+              <a:defRPr sz="1700"/>
             </a:lvl8pPr>
             <a:lvl9pPr>
-              <a:defRPr sz="2200"/>
+              <a:defRPr sz="1700"/>
             </a:lvl9pPr>
           </a:lstStyle>
           <a:p>
@@ -1342,7 +1342,7 @@
           <a:p>
             <a:fld id="{631F3B9D-D187-4196-BC59-C5BAE8C8D526}" type="datetimeFigureOut">
               <a:rPr lang="fr-FR" smtClean="0"/>
-              <a:t>22/06/2017</a:t>
+              <a:t>29/06/2017</a:t>
             </a:fld>
             <a:endParaRPr lang="fr-FR"/>
           </a:p>
@@ -1459,8 +1459,8 @@
         </p:nvSpPr>
         <p:spPr>
           <a:xfrm>
-            <a:off x="248444" y="2014839"/>
-            <a:ext cx="2195450" cy="839687"/>
+            <a:off x="192646" y="1571721"/>
+            <a:ext cx="1702350" cy="655015"/>
           </a:xfrm>
         </p:spPr>
         <p:txBody>
@@ -1468,39 +1468,39 @@
           <a:lstStyle>
             <a:lvl1pPr marL="0" indent="0">
               <a:buNone/>
-              <a:defRPr sz="2800" b="1"/>
+              <a:defRPr sz="2200" b="1"/>
             </a:lvl1pPr>
-            <a:lvl2pPr marL="540064" indent="0">
-              <a:buNone/>
-              <a:defRPr sz="2300" b="1"/>
+            <a:lvl2pPr marL="424510" indent="0">
+              <a:buNone/>
+              <a:defRPr sz="1800" b="1"/>
             </a:lvl2pPr>
-            <a:lvl3pPr marL="1080130" indent="0">
-              <a:buNone/>
-              <a:defRPr sz="2200" b="1"/>
+            <a:lvl3pPr marL="849021" indent="0">
+              <a:buNone/>
+              <a:defRPr sz="1700" b="1"/>
             </a:lvl3pPr>
-            <a:lvl4pPr marL="1620194" indent="0">
-              <a:buNone/>
-              <a:defRPr sz="1900" b="1"/>
+            <a:lvl4pPr marL="1273532" indent="0">
+              <a:buNone/>
+              <a:defRPr sz="1500" b="1"/>
             </a:lvl4pPr>
-            <a:lvl5pPr marL="2160259" indent="0">
-              <a:buNone/>
-              <a:defRPr sz="1900" b="1"/>
+            <a:lvl5pPr marL="1698043" indent="0">
+              <a:buNone/>
+              <a:defRPr sz="1500" b="1"/>
             </a:lvl5pPr>
-            <a:lvl6pPr marL="2700324" indent="0">
-              <a:buNone/>
-              <a:defRPr sz="1900" b="1"/>
+            <a:lvl6pPr marL="2122553" indent="0">
+              <a:buNone/>
+              <a:defRPr sz="1500" b="1"/>
             </a:lvl6pPr>
-            <a:lvl7pPr marL="3240388" indent="0">
-              <a:buNone/>
-              <a:defRPr sz="1900" b="1"/>
+            <a:lvl7pPr marL="2547063" indent="0">
+              <a:buNone/>
+              <a:defRPr sz="1500" b="1"/>
             </a:lvl7pPr>
-            <a:lvl8pPr marL="3780453" indent="0">
-              <a:buNone/>
-              <a:defRPr sz="1900" b="1"/>
+            <a:lvl8pPr marL="2971574" indent="0">
+              <a:buNone/>
+              <a:defRPr sz="1500" b="1"/>
             </a:lvl8pPr>
-            <a:lvl9pPr marL="4320517" indent="0">
-              <a:buNone/>
-              <a:defRPr sz="1900" b="1"/>
+            <a:lvl9pPr marL="3396083" indent="0">
+              <a:buNone/>
+              <a:defRPr sz="1500" b="1"/>
             </a:lvl9pPr>
           </a:lstStyle>
           <a:p>
@@ -1524,39 +1524,39 @@
         </p:nvSpPr>
         <p:spPr>
           <a:xfrm>
-            <a:off x="248444" y="2854529"/>
-            <a:ext cx="2195450" cy="5186065"/>
+            <a:off x="192646" y="2226738"/>
+            <a:ext cx="1702350" cy="4045497"/>
           </a:xfrm>
         </p:spPr>
         <p:txBody>
           <a:bodyPr/>
           <a:lstStyle>
             <a:lvl1pPr>
-              <a:defRPr sz="2800"/>
+              <a:defRPr sz="2200"/>
             </a:lvl1pPr>
             <a:lvl2pPr>
-              <a:defRPr sz="2300"/>
+              <a:defRPr sz="1800"/>
             </a:lvl2pPr>
             <a:lvl3pPr>
-              <a:defRPr sz="2200"/>
+              <a:defRPr sz="1700"/>
             </a:lvl3pPr>
             <a:lvl4pPr>
-              <a:defRPr sz="1900"/>
+              <a:defRPr sz="1500"/>
             </a:lvl4pPr>
             <a:lvl5pPr>
-              <a:defRPr sz="1900"/>
+              <a:defRPr sz="1500"/>
             </a:lvl5pPr>
             <a:lvl6pPr>
-              <a:defRPr sz="1900"/>
+              <a:defRPr sz="1500"/>
             </a:lvl6pPr>
             <a:lvl7pPr>
-              <a:defRPr sz="1900"/>
+              <a:defRPr sz="1500"/>
             </a:lvl7pPr>
             <a:lvl8pPr>
-              <a:defRPr sz="1900"/>
+              <a:defRPr sz="1500"/>
             </a:lvl8pPr>
             <a:lvl9pPr>
-              <a:defRPr sz="1900"/>
+              <a:defRPr sz="1500"/>
             </a:lvl9pPr>
           </a:lstStyle>
           <a:p>
@@ -1609,8 +1609,8 @@
         </p:nvSpPr>
         <p:spPr>
           <a:xfrm>
-            <a:off x="2524121" y="2014839"/>
-            <a:ext cx="2196311" cy="839687"/>
+            <a:off x="1957203" y="1571721"/>
+            <a:ext cx="1703018" cy="655015"/>
           </a:xfrm>
         </p:spPr>
         <p:txBody>
@@ -1618,39 +1618,39 @@
           <a:lstStyle>
             <a:lvl1pPr marL="0" indent="0">
               <a:buNone/>
-              <a:defRPr sz="2800" b="1"/>
+              <a:defRPr sz="2200" b="1"/>
             </a:lvl1pPr>
-            <a:lvl2pPr marL="540064" indent="0">
-              <a:buNone/>
-              <a:defRPr sz="2300" b="1"/>
+            <a:lvl2pPr marL="424510" indent="0">
+              <a:buNone/>
+              <a:defRPr sz="1800" b="1"/>
             </a:lvl2pPr>
-            <a:lvl3pPr marL="1080130" indent="0">
-              <a:buNone/>
-              <a:defRPr sz="2200" b="1"/>
+            <a:lvl3pPr marL="849021" indent="0">
+              <a:buNone/>
+              <a:defRPr sz="1700" b="1"/>
             </a:lvl3pPr>
-            <a:lvl4pPr marL="1620194" indent="0">
-              <a:buNone/>
-              <a:defRPr sz="1900" b="1"/>
+            <a:lvl4pPr marL="1273532" indent="0">
+              <a:buNone/>
+              <a:defRPr sz="1500" b="1"/>
             </a:lvl4pPr>
-            <a:lvl5pPr marL="2160259" indent="0">
-              <a:buNone/>
-              <a:defRPr sz="1900" b="1"/>
+            <a:lvl5pPr marL="1698043" indent="0">
+              <a:buNone/>
+              <a:defRPr sz="1500" b="1"/>
             </a:lvl5pPr>
-            <a:lvl6pPr marL="2700324" indent="0">
-              <a:buNone/>
-              <a:defRPr sz="1900" b="1"/>
+            <a:lvl6pPr marL="2122553" indent="0">
+              <a:buNone/>
+              <a:defRPr sz="1500" b="1"/>
             </a:lvl6pPr>
-            <a:lvl7pPr marL="3240388" indent="0">
-              <a:buNone/>
-              <a:defRPr sz="1900" b="1"/>
+            <a:lvl7pPr marL="2547063" indent="0">
+              <a:buNone/>
+              <a:defRPr sz="1500" b="1"/>
             </a:lvl7pPr>
-            <a:lvl8pPr marL="3780453" indent="0">
-              <a:buNone/>
-              <a:defRPr sz="1900" b="1"/>
+            <a:lvl8pPr marL="2971574" indent="0">
+              <a:buNone/>
+              <a:defRPr sz="1500" b="1"/>
             </a:lvl8pPr>
-            <a:lvl9pPr marL="4320517" indent="0">
-              <a:buNone/>
-              <a:defRPr sz="1900" b="1"/>
+            <a:lvl9pPr marL="3396083" indent="0">
+              <a:buNone/>
+              <a:defRPr sz="1500" b="1"/>
             </a:lvl9pPr>
           </a:lstStyle>
           <a:p>
@@ -1674,39 +1674,39 @@
         </p:nvSpPr>
         <p:spPr>
           <a:xfrm>
-            <a:off x="2524121" y="2854529"/>
-            <a:ext cx="2196311" cy="5186065"/>
+            <a:off x="1957203" y="2226738"/>
+            <a:ext cx="1703018" cy="4045497"/>
           </a:xfrm>
         </p:spPr>
         <p:txBody>
           <a:bodyPr/>
           <a:lstStyle>
             <a:lvl1pPr>
-              <a:defRPr sz="2800"/>
+              <a:defRPr sz="2200"/>
             </a:lvl1pPr>
             <a:lvl2pPr>
-              <a:defRPr sz="2300"/>
+              <a:defRPr sz="1800"/>
             </a:lvl2pPr>
             <a:lvl3pPr>
-              <a:defRPr sz="2200"/>
+              <a:defRPr sz="1700"/>
             </a:lvl3pPr>
             <a:lvl4pPr>
-              <a:defRPr sz="1900"/>
+              <a:defRPr sz="1500"/>
             </a:lvl4pPr>
             <a:lvl5pPr>
-              <a:defRPr sz="1900"/>
+              <a:defRPr sz="1500"/>
             </a:lvl5pPr>
             <a:lvl6pPr>
-              <a:defRPr sz="1900"/>
+              <a:defRPr sz="1500"/>
             </a:lvl6pPr>
             <a:lvl7pPr>
-              <a:defRPr sz="1900"/>
+              <a:defRPr sz="1500"/>
             </a:lvl7pPr>
             <a:lvl8pPr>
-              <a:defRPr sz="1900"/>
+              <a:defRPr sz="1500"/>
             </a:lvl8pPr>
             <a:lvl9pPr>
-              <a:defRPr sz="1900"/>
+              <a:defRPr sz="1500"/>
             </a:lvl9pPr>
           </a:lstStyle>
           <a:p>
@@ -1764,7 +1764,7 @@
           <a:p>
             <a:fld id="{631F3B9D-D187-4196-BC59-C5BAE8C8D526}" type="datetimeFigureOut">
               <a:rPr lang="fr-FR" smtClean="0"/>
-              <a:t>22/06/2017</a:t>
+              <a:t>29/06/2017</a:t>
             </a:fld>
             <a:endParaRPr lang="fr-FR"/>
           </a:p>
@@ -1882,7 +1882,7 @@
           <a:p>
             <a:fld id="{631F3B9D-D187-4196-BC59-C5BAE8C8D526}" type="datetimeFigureOut">
               <a:rPr lang="fr-FR" smtClean="0"/>
-              <a:t>22/06/2017</a:t>
+              <a:t>29/06/2017</a:t>
             </a:fld>
             <a:endParaRPr lang="fr-FR"/>
           </a:p>
@@ -1977,7 +1977,7 @@
           <a:p>
             <a:fld id="{631F3B9D-D187-4196-BC59-C5BAE8C8D526}" type="datetimeFigureOut">
               <a:rPr lang="fr-FR" smtClean="0"/>
-              <a:t>22/06/2017</a:t>
+              <a:t>29/06/2017</a:t>
             </a:fld>
             <a:endParaRPr lang="fr-FR"/>
           </a:p>
@@ -2067,15 +2067,15 @@
         </p:nvSpPr>
         <p:spPr>
           <a:xfrm>
-            <a:off x="248445" y="358381"/>
-            <a:ext cx="1634725" cy="1525191"/>
+            <a:off x="192646" y="279567"/>
+            <a:ext cx="1267565" cy="1189757"/>
           </a:xfrm>
         </p:spPr>
         <p:txBody>
           <a:bodyPr anchor="b"/>
           <a:lstStyle>
             <a:lvl1pPr algn="l">
-              <a:defRPr sz="2300" b="1"/>
+              <a:defRPr sz="1800" b="1"/>
             </a:lvl1pPr>
           </a:lstStyle>
           <a:p>
@@ -2099,39 +2099,39 @@
         </p:nvSpPr>
         <p:spPr>
           <a:xfrm>
-            <a:off x="1942694" y="358384"/>
-            <a:ext cx="2777739" cy="7682210"/>
+            <a:off x="1506366" y="279565"/>
+            <a:ext cx="2153857" cy="5992666"/>
           </a:xfrm>
         </p:spPr>
         <p:txBody>
           <a:bodyPr/>
           <a:lstStyle>
             <a:lvl1pPr>
-              <a:defRPr sz="3900"/>
+              <a:defRPr sz="3100"/>
             </a:lvl1pPr>
             <a:lvl2pPr>
-              <a:defRPr sz="3400"/>
+              <a:defRPr sz="2700"/>
             </a:lvl2pPr>
             <a:lvl3pPr>
-              <a:defRPr sz="2800"/>
+              <a:defRPr sz="2200"/>
             </a:lvl3pPr>
             <a:lvl4pPr>
-              <a:defRPr sz="2300"/>
+              <a:defRPr sz="1800"/>
             </a:lvl4pPr>
             <a:lvl5pPr>
-              <a:defRPr sz="2300"/>
+              <a:defRPr sz="1800"/>
             </a:lvl5pPr>
             <a:lvl6pPr>
-              <a:defRPr sz="2300"/>
+              <a:defRPr sz="1800"/>
             </a:lvl6pPr>
             <a:lvl7pPr>
-              <a:defRPr sz="2300"/>
+              <a:defRPr sz="1800"/>
             </a:lvl7pPr>
             <a:lvl8pPr>
-              <a:defRPr sz="2300"/>
+              <a:defRPr sz="1800"/>
             </a:lvl8pPr>
             <a:lvl9pPr>
-              <a:defRPr sz="2300"/>
+              <a:defRPr sz="1800"/>
             </a:lvl9pPr>
           </a:lstStyle>
           <a:p>
@@ -2184,8 +2184,8 @@
         </p:nvSpPr>
         <p:spPr>
           <a:xfrm>
-            <a:off x="248445" y="1883572"/>
-            <a:ext cx="1634725" cy="6157022"/>
+            <a:off x="192646" y="1469319"/>
+            <a:ext cx="1267565" cy="4802912"/>
           </a:xfrm>
         </p:spPr>
         <p:txBody>
@@ -2193,39 +2193,39 @@
           <a:lstStyle>
             <a:lvl1pPr marL="0" indent="0">
               <a:buNone/>
-              <a:defRPr sz="1700"/>
+              <a:defRPr sz="1300"/>
             </a:lvl1pPr>
-            <a:lvl2pPr marL="540064" indent="0">
-              <a:buNone/>
-              <a:defRPr sz="1500"/>
+            <a:lvl2pPr marL="424510" indent="0">
+              <a:buNone/>
+              <a:defRPr sz="1200"/>
             </a:lvl2pPr>
-            <a:lvl3pPr marL="1080130" indent="0">
-              <a:buNone/>
-              <a:defRPr sz="1200"/>
+            <a:lvl3pPr marL="849021" indent="0">
+              <a:buNone/>
+              <a:defRPr sz="900"/>
             </a:lvl3pPr>
-            <a:lvl4pPr marL="1620194" indent="0">
-              <a:buNone/>
-              <a:defRPr sz="1200"/>
+            <a:lvl4pPr marL="1273532" indent="0">
+              <a:buNone/>
+              <a:defRPr sz="900"/>
             </a:lvl4pPr>
-            <a:lvl5pPr marL="2160259" indent="0">
-              <a:buNone/>
-              <a:defRPr sz="1200"/>
+            <a:lvl5pPr marL="1698043" indent="0">
+              <a:buNone/>
+              <a:defRPr sz="900"/>
             </a:lvl5pPr>
-            <a:lvl6pPr marL="2700324" indent="0">
-              <a:buNone/>
-              <a:defRPr sz="1200"/>
+            <a:lvl6pPr marL="2122553" indent="0">
+              <a:buNone/>
+              <a:defRPr sz="900"/>
             </a:lvl6pPr>
-            <a:lvl7pPr marL="3240388" indent="0">
-              <a:buNone/>
-              <a:defRPr sz="1200"/>
+            <a:lvl7pPr marL="2547063" indent="0">
+              <a:buNone/>
+              <a:defRPr sz="900"/>
             </a:lvl7pPr>
-            <a:lvl8pPr marL="3780453" indent="0">
-              <a:buNone/>
-              <a:defRPr sz="1200"/>
+            <a:lvl8pPr marL="2971574" indent="0">
+              <a:buNone/>
+              <a:defRPr sz="900"/>
             </a:lvl8pPr>
-            <a:lvl9pPr marL="4320517" indent="0">
-              <a:buNone/>
-              <a:defRPr sz="1200"/>
+            <a:lvl9pPr marL="3396083" indent="0">
+              <a:buNone/>
+              <a:defRPr sz="900"/>
             </a:lvl9pPr>
           </a:lstStyle>
           <a:p>
@@ -2254,7 +2254,7 @@
           <a:p>
             <a:fld id="{631F3B9D-D187-4196-BC59-C5BAE8C8D526}" type="datetimeFigureOut">
               <a:rPr lang="fr-FR" smtClean="0"/>
-              <a:t>22/06/2017</a:t>
+              <a:t>29/06/2017</a:t>
             </a:fld>
             <a:endParaRPr lang="fr-FR"/>
           </a:p>
@@ -2344,15 +2344,15 @@
         </p:nvSpPr>
         <p:spPr>
           <a:xfrm>
-            <a:off x="973938" y="6300791"/>
-            <a:ext cx="2981325" cy="743844"/>
+            <a:off x="755192" y="4915066"/>
+            <a:ext cx="2311718" cy="580251"/>
           </a:xfrm>
         </p:spPr>
         <p:txBody>
           <a:bodyPr anchor="b"/>
           <a:lstStyle>
             <a:lvl1pPr algn="l">
-              <a:defRPr sz="2300" b="1"/>
+              <a:defRPr sz="1800" b="1"/>
             </a:lvl1pPr>
           </a:lstStyle>
           <a:p>
@@ -2376,8 +2376,8 @@
         </p:nvSpPr>
         <p:spPr>
           <a:xfrm>
-            <a:off x="973938" y="804273"/>
-            <a:ext cx="2981325" cy="5400675"/>
+            <a:off x="755192" y="627390"/>
+            <a:ext cx="2311718" cy="4212908"/>
           </a:xfrm>
         </p:spPr>
         <p:txBody>
@@ -2385,39 +2385,39 @@
           <a:lstStyle>
             <a:lvl1pPr marL="0" indent="0">
               <a:buNone/>
-              <a:defRPr sz="3900"/>
+              <a:defRPr sz="3100"/>
             </a:lvl1pPr>
-            <a:lvl2pPr marL="540064" indent="0">
-              <a:buNone/>
-              <a:defRPr sz="3400"/>
+            <a:lvl2pPr marL="424510" indent="0">
+              <a:buNone/>
+              <a:defRPr sz="2700"/>
             </a:lvl2pPr>
-            <a:lvl3pPr marL="1080130" indent="0">
-              <a:buNone/>
-              <a:defRPr sz="2800"/>
+            <a:lvl3pPr marL="849021" indent="0">
+              <a:buNone/>
+              <a:defRPr sz="2200"/>
             </a:lvl3pPr>
-            <a:lvl4pPr marL="1620194" indent="0">
-              <a:buNone/>
-              <a:defRPr sz="2300"/>
+            <a:lvl4pPr marL="1273532" indent="0">
+              <a:buNone/>
+              <a:defRPr sz="1800"/>
             </a:lvl4pPr>
-            <a:lvl5pPr marL="2160259" indent="0">
-              <a:buNone/>
-              <a:defRPr sz="2300"/>
+            <a:lvl5pPr marL="1698043" indent="0">
+              <a:buNone/>
+              <a:defRPr sz="1800"/>
             </a:lvl5pPr>
-            <a:lvl6pPr marL="2700324" indent="0">
-              <a:buNone/>
-              <a:defRPr sz="2300"/>
+            <a:lvl6pPr marL="2122553" indent="0">
+              <a:buNone/>
+              <a:defRPr sz="1800"/>
             </a:lvl6pPr>
-            <a:lvl7pPr marL="3240388" indent="0">
-              <a:buNone/>
-              <a:defRPr sz="2300"/>
+            <a:lvl7pPr marL="2547063" indent="0">
+              <a:buNone/>
+              <a:defRPr sz="1800"/>
             </a:lvl7pPr>
-            <a:lvl8pPr marL="3780453" indent="0">
-              <a:buNone/>
-              <a:defRPr sz="2300"/>
+            <a:lvl8pPr marL="2971574" indent="0">
+              <a:buNone/>
+              <a:defRPr sz="1800"/>
             </a:lvl8pPr>
-            <a:lvl9pPr marL="4320517" indent="0">
-              <a:buNone/>
-              <a:defRPr sz="2300"/>
+            <a:lvl9pPr marL="3396083" indent="0">
+              <a:buNone/>
+              <a:defRPr sz="1800"/>
             </a:lvl9pPr>
           </a:lstStyle>
           <a:p>
@@ -2437,8 +2437,8 @@
         </p:nvSpPr>
         <p:spPr>
           <a:xfrm>
-            <a:off x="973938" y="7044632"/>
-            <a:ext cx="2981325" cy="1056382"/>
+            <a:off x="755192" y="5495314"/>
+            <a:ext cx="2311718" cy="824053"/>
           </a:xfrm>
         </p:spPr>
         <p:txBody>
@@ -2446,39 +2446,39 @@
           <a:lstStyle>
             <a:lvl1pPr marL="0" indent="0">
               <a:buNone/>
-              <a:defRPr sz="1700"/>
+              <a:defRPr sz="1300"/>
             </a:lvl1pPr>
-            <a:lvl2pPr marL="540064" indent="0">
-              <a:buNone/>
-              <a:defRPr sz="1500"/>
+            <a:lvl2pPr marL="424510" indent="0">
+              <a:buNone/>
+              <a:defRPr sz="1200"/>
             </a:lvl2pPr>
-            <a:lvl3pPr marL="1080130" indent="0">
-              <a:buNone/>
-              <a:defRPr sz="1200"/>
+            <a:lvl3pPr marL="849021" indent="0">
+              <a:buNone/>
+              <a:defRPr sz="900"/>
             </a:lvl3pPr>
-            <a:lvl4pPr marL="1620194" indent="0">
-              <a:buNone/>
-              <a:defRPr sz="1200"/>
+            <a:lvl4pPr marL="1273532" indent="0">
+              <a:buNone/>
+              <a:defRPr sz="900"/>
             </a:lvl4pPr>
-            <a:lvl5pPr marL="2160259" indent="0">
-              <a:buNone/>
-              <a:defRPr sz="1200"/>
+            <a:lvl5pPr marL="1698043" indent="0">
+              <a:buNone/>
+              <a:defRPr sz="900"/>
             </a:lvl5pPr>
-            <a:lvl6pPr marL="2700324" indent="0">
-              <a:buNone/>
-              <a:defRPr sz="1200"/>
+            <a:lvl6pPr marL="2122553" indent="0">
+              <a:buNone/>
+              <a:defRPr sz="900"/>
             </a:lvl6pPr>
-            <a:lvl7pPr marL="3240388" indent="0">
-              <a:buNone/>
-              <a:defRPr sz="1200"/>
+            <a:lvl7pPr marL="2547063" indent="0">
+              <a:buNone/>
+              <a:defRPr sz="900"/>
             </a:lvl7pPr>
-            <a:lvl8pPr marL="3780453" indent="0">
-              <a:buNone/>
-              <a:defRPr sz="1200"/>
+            <a:lvl8pPr marL="2971574" indent="0">
+              <a:buNone/>
+              <a:defRPr sz="900"/>
             </a:lvl8pPr>
-            <a:lvl9pPr marL="4320517" indent="0">
-              <a:buNone/>
-              <a:defRPr sz="1200"/>
+            <a:lvl9pPr marL="3396083" indent="0">
+              <a:buNone/>
+              <a:defRPr sz="900"/>
             </a:lvl9pPr>
           </a:lstStyle>
           <a:p>
@@ -2507,7 +2507,7 @@
           <a:p>
             <a:fld id="{631F3B9D-D187-4196-BC59-C5BAE8C8D526}" type="datetimeFigureOut">
               <a:rPr lang="fr-FR" smtClean="0"/>
-              <a:t>22/06/2017</a:t>
+              <a:t>29/06/2017</a:t>
             </a:fld>
             <a:endParaRPr lang="fr-FR"/>
           </a:p>
@@ -2602,15 +2602,15 @@
         </p:nvSpPr>
         <p:spPr>
           <a:xfrm>
-            <a:off x="248447" y="360462"/>
-            <a:ext cx="4471987" cy="1500188"/>
+            <a:off x="192648" y="281190"/>
+            <a:ext cx="3467576" cy="1170253"/>
           </a:xfrm>
           <a:prstGeom prst="rect">
             <a:avLst/>
           </a:prstGeom>
         </p:spPr>
         <p:txBody>
-          <a:bodyPr vert="horz" lIns="108013" tIns="54006" rIns="108013" bIns="54006" rtlCol="0" anchor="ctr">
+          <a:bodyPr vert="horz" lIns="84902" tIns="42450" rIns="84902" bIns="42450" rtlCol="0" anchor="ctr">
             <a:normAutofit/>
           </a:bodyPr>
           <a:lstStyle/>
@@ -2635,15 +2635,15 @@
         </p:nvSpPr>
         <p:spPr>
           <a:xfrm>
-            <a:off x="248447" y="2100266"/>
-            <a:ext cx="4471987" cy="5940326"/>
+            <a:off x="192648" y="1638356"/>
+            <a:ext cx="3467576" cy="4633874"/>
           </a:xfrm>
           <a:prstGeom prst="rect">
             <a:avLst/>
           </a:prstGeom>
         </p:spPr>
         <p:txBody>
-          <a:bodyPr vert="horz" lIns="108013" tIns="54006" rIns="108013" bIns="54006" rtlCol="0">
+          <a:bodyPr vert="horz" lIns="84902" tIns="42450" rIns="84902" bIns="42450" rtlCol="0">
             <a:normAutofit/>
           </a:bodyPr>
           <a:lstStyle/>
@@ -2697,18 +2697,18 @@
         </p:nvSpPr>
         <p:spPr>
           <a:xfrm>
-            <a:off x="248446" y="8342713"/>
-            <a:ext cx="1159404" cy="479227"/>
+            <a:off x="192645" y="6507909"/>
+            <a:ext cx="899001" cy="373831"/>
           </a:xfrm>
           <a:prstGeom prst="rect">
             <a:avLst/>
           </a:prstGeom>
         </p:spPr>
         <p:txBody>
-          <a:bodyPr vert="horz" lIns="108013" tIns="54006" rIns="108013" bIns="54006" rtlCol="0" anchor="ctr"/>
+          <a:bodyPr vert="horz" lIns="84902" tIns="42450" rIns="84902" bIns="42450" rtlCol="0" anchor="ctr"/>
           <a:lstStyle>
             <a:lvl1pPr algn="l">
-              <a:defRPr sz="1500">
+              <a:defRPr sz="1200">
                 <a:solidFill>
                   <a:schemeClr val="tx1">
                     <a:tint val="75000"/>
@@ -2720,7 +2720,7 @@
           <a:p>
             <a:fld id="{631F3B9D-D187-4196-BC59-C5BAE8C8D526}" type="datetimeFigureOut">
               <a:rPr lang="fr-FR" smtClean="0"/>
-              <a:t>22/06/2017</a:t>
+              <a:t>29/06/2017</a:t>
             </a:fld>
             <a:endParaRPr lang="fr-FR"/>
           </a:p>
@@ -2738,18 +2738,18 @@
         </p:nvSpPr>
         <p:spPr>
           <a:xfrm>
-            <a:off x="1697699" y="8342713"/>
-            <a:ext cx="1573478" cy="479227"/>
+            <a:off x="1316396" y="6507909"/>
+            <a:ext cx="1220074" cy="373831"/>
           </a:xfrm>
           <a:prstGeom prst="rect">
             <a:avLst/>
           </a:prstGeom>
         </p:spPr>
         <p:txBody>
-          <a:bodyPr vert="horz" lIns="108013" tIns="54006" rIns="108013" bIns="54006" rtlCol="0" anchor="ctr"/>
+          <a:bodyPr vert="horz" lIns="84902" tIns="42450" rIns="84902" bIns="42450" rtlCol="0" anchor="ctr"/>
           <a:lstStyle>
             <a:lvl1pPr algn="ctr">
-              <a:defRPr sz="1500">
+              <a:defRPr sz="1200">
                 <a:solidFill>
                   <a:schemeClr val="tx1">
                     <a:tint val="75000"/>
@@ -2775,18 +2775,18 @@
         </p:nvSpPr>
         <p:spPr>
           <a:xfrm>
-            <a:off x="3561028" y="8342713"/>
-            <a:ext cx="1159404" cy="479227"/>
+            <a:off x="2761220" y="6507909"/>
+            <a:ext cx="899001" cy="373831"/>
           </a:xfrm>
           <a:prstGeom prst="rect">
             <a:avLst/>
           </a:prstGeom>
         </p:spPr>
         <p:txBody>
-          <a:bodyPr vert="horz" lIns="108013" tIns="54006" rIns="108013" bIns="54006" rtlCol="0" anchor="ctr"/>
+          <a:bodyPr vert="horz" lIns="84902" tIns="42450" rIns="84902" bIns="42450" rtlCol="0" anchor="ctr"/>
           <a:lstStyle>
             <a:lvl1pPr algn="r">
-              <a:defRPr sz="1500">
+              <a:defRPr sz="1200">
                 <a:solidFill>
                   <a:schemeClr val="tx1">
                     <a:tint val="75000"/>
@@ -2827,12 +2827,12 @@
   </p:sldLayoutIdLst>
   <p:txStyles>
     <p:titleStyle>
-      <a:lvl1pPr algn="ctr" defTabSz="1080130" rtl="0" eaLnBrk="1" latinLnBrk="0" hangingPunct="1">
+      <a:lvl1pPr algn="ctr" defTabSz="849021" rtl="0" eaLnBrk="1" latinLnBrk="0" hangingPunct="1">
         <a:spcBef>
           <a:spcPct val="0"/>
         </a:spcBef>
         <a:buNone/>
-        <a:defRPr sz="5100" kern="1200">
+        <a:defRPr sz="4000" kern="1200">
           <a:solidFill>
             <a:schemeClr val="tx1"/>
           </a:solidFill>
@@ -2843,13 +2843,13 @@
       </a:lvl1pPr>
     </p:titleStyle>
     <p:bodyStyle>
-      <a:lvl1pPr marL="405049" indent="-405049" algn="l" defTabSz="1080130" rtl="0" eaLnBrk="1" latinLnBrk="0" hangingPunct="1">
+      <a:lvl1pPr marL="318383" indent="-318383" algn="l" defTabSz="849021" rtl="0" eaLnBrk="1" latinLnBrk="0" hangingPunct="1">
         <a:spcBef>
           <a:spcPct val="20000"/>
         </a:spcBef>
         <a:buFont typeface="Arial" pitchFamily="34" charset="0"/>
         <a:buChar char="•"/>
-        <a:defRPr sz="3900" kern="1200">
+        <a:defRPr sz="3100" kern="1200">
           <a:solidFill>
             <a:schemeClr val="tx1"/>
           </a:solidFill>
@@ -2858,13 +2858,13 @@
           <a:cs typeface="+mn-cs"/>
         </a:defRPr>
       </a:lvl1pPr>
-      <a:lvl2pPr marL="877605" indent="-337541" algn="l" defTabSz="1080130" rtl="0" eaLnBrk="1" latinLnBrk="0" hangingPunct="1">
+      <a:lvl2pPr marL="689829" indent="-265320" algn="l" defTabSz="849021" rtl="0" eaLnBrk="1" latinLnBrk="0" hangingPunct="1">
         <a:spcBef>
           <a:spcPct val="20000"/>
         </a:spcBef>
         <a:buFont typeface="Arial" pitchFamily="34" charset="0"/>
         <a:buChar char="–"/>
-        <a:defRPr sz="3400" kern="1200">
+        <a:defRPr sz="2700" kern="1200">
           <a:solidFill>
             <a:schemeClr val="tx1"/>
           </a:solidFill>
@@ -2873,13 +2873,13 @@
           <a:cs typeface="+mn-cs"/>
         </a:defRPr>
       </a:lvl2pPr>
-      <a:lvl3pPr marL="1350163" indent="-270033" algn="l" defTabSz="1080130" rtl="0" eaLnBrk="1" latinLnBrk="0" hangingPunct="1">
+      <a:lvl3pPr marL="1061277" indent="-212256" algn="l" defTabSz="849021" rtl="0" eaLnBrk="1" latinLnBrk="0" hangingPunct="1">
         <a:spcBef>
           <a:spcPct val="20000"/>
         </a:spcBef>
         <a:buFont typeface="Arial" pitchFamily="34" charset="0"/>
         <a:buChar char="•"/>
-        <a:defRPr sz="2800" kern="1200">
+        <a:defRPr sz="2200" kern="1200">
           <a:solidFill>
             <a:schemeClr val="tx1"/>
           </a:solidFill>
@@ -2888,13 +2888,13 @@
           <a:cs typeface="+mn-cs"/>
         </a:defRPr>
       </a:lvl3pPr>
-      <a:lvl4pPr marL="1890226" indent="-270033" algn="l" defTabSz="1080130" rtl="0" eaLnBrk="1" latinLnBrk="0" hangingPunct="1">
+      <a:lvl4pPr marL="1485787" indent="-212256" algn="l" defTabSz="849021" rtl="0" eaLnBrk="1" latinLnBrk="0" hangingPunct="1">
         <a:spcBef>
           <a:spcPct val="20000"/>
         </a:spcBef>
         <a:buFont typeface="Arial" pitchFamily="34" charset="0"/>
         <a:buChar char="–"/>
-        <a:defRPr sz="2300" kern="1200">
+        <a:defRPr sz="1800" kern="1200">
           <a:solidFill>
             <a:schemeClr val="tx1"/>
           </a:solidFill>
@@ -2903,13 +2903,13 @@
           <a:cs typeface="+mn-cs"/>
         </a:defRPr>
       </a:lvl4pPr>
-      <a:lvl5pPr marL="2430290" indent="-270033" algn="l" defTabSz="1080130" rtl="0" eaLnBrk="1" latinLnBrk="0" hangingPunct="1">
+      <a:lvl5pPr marL="1910297" indent="-212256" algn="l" defTabSz="849021" rtl="0" eaLnBrk="1" latinLnBrk="0" hangingPunct="1">
         <a:spcBef>
           <a:spcPct val="20000"/>
         </a:spcBef>
         <a:buFont typeface="Arial" pitchFamily="34" charset="0"/>
         <a:buChar char="»"/>
-        <a:defRPr sz="2300" kern="1200">
+        <a:defRPr sz="1800" kern="1200">
           <a:solidFill>
             <a:schemeClr val="tx1"/>
           </a:solidFill>
@@ -2918,13 +2918,13 @@
           <a:cs typeface="+mn-cs"/>
         </a:defRPr>
       </a:lvl5pPr>
-      <a:lvl6pPr marL="2970356" indent="-270033" algn="l" defTabSz="1080130" rtl="0" eaLnBrk="1" latinLnBrk="0" hangingPunct="1">
+      <a:lvl6pPr marL="2334808" indent="-212256" algn="l" defTabSz="849021" rtl="0" eaLnBrk="1" latinLnBrk="0" hangingPunct="1">
         <a:spcBef>
           <a:spcPct val="20000"/>
         </a:spcBef>
         <a:buFont typeface="Arial" pitchFamily="34" charset="0"/>
         <a:buChar char="•"/>
-        <a:defRPr sz="2300" kern="1200">
+        <a:defRPr sz="1800" kern="1200">
           <a:solidFill>
             <a:schemeClr val="tx1"/>
           </a:solidFill>
@@ -2933,13 +2933,13 @@
           <a:cs typeface="+mn-cs"/>
         </a:defRPr>
       </a:lvl6pPr>
-      <a:lvl7pPr marL="3510420" indent="-270033" algn="l" defTabSz="1080130" rtl="0" eaLnBrk="1" latinLnBrk="0" hangingPunct="1">
+      <a:lvl7pPr marL="2759318" indent="-212256" algn="l" defTabSz="849021" rtl="0" eaLnBrk="1" latinLnBrk="0" hangingPunct="1">
         <a:spcBef>
           <a:spcPct val="20000"/>
         </a:spcBef>
         <a:buFont typeface="Arial" pitchFamily="34" charset="0"/>
         <a:buChar char="•"/>
-        <a:defRPr sz="2300" kern="1200">
+        <a:defRPr sz="1800" kern="1200">
           <a:solidFill>
             <a:schemeClr val="tx1"/>
           </a:solidFill>
@@ -2948,13 +2948,13 @@
           <a:cs typeface="+mn-cs"/>
         </a:defRPr>
       </a:lvl7pPr>
-      <a:lvl8pPr marL="4050484" indent="-270033" algn="l" defTabSz="1080130" rtl="0" eaLnBrk="1" latinLnBrk="0" hangingPunct="1">
+      <a:lvl8pPr marL="3183828" indent="-212256" algn="l" defTabSz="849021" rtl="0" eaLnBrk="1" latinLnBrk="0" hangingPunct="1">
         <a:spcBef>
           <a:spcPct val="20000"/>
         </a:spcBef>
         <a:buFont typeface="Arial" pitchFamily="34" charset="0"/>
         <a:buChar char="•"/>
-        <a:defRPr sz="2300" kern="1200">
+        <a:defRPr sz="1800" kern="1200">
           <a:solidFill>
             <a:schemeClr val="tx1"/>
           </a:solidFill>
@@ -2963,13 +2963,13 @@
           <a:cs typeface="+mn-cs"/>
         </a:defRPr>
       </a:lvl8pPr>
-      <a:lvl9pPr marL="4590550" indent="-270033" algn="l" defTabSz="1080130" rtl="0" eaLnBrk="1" latinLnBrk="0" hangingPunct="1">
+      <a:lvl9pPr marL="3608340" indent="-212256" algn="l" defTabSz="849021" rtl="0" eaLnBrk="1" latinLnBrk="0" hangingPunct="1">
         <a:spcBef>
           <a:spcPct val="20000"/>
         </a:spcBef>
         <a:buFont typeface="Arial" pitchFamily="34" charset="0"/>
         <a:buChar char="•"/>
-        <a:defRPr sz="2300" kern="1200">
+        <a:defRPr sz="1800" kern="1200">
           <a:solidFill>
             <a:schemeClr val="tx1"/>
           </a:solidFill>
@@ -2983,8 +2983,8 @@
       <a:defPPr>
         <a:defRPr lang="fr-FR"/>
       </a:defPPr>
-      <a:lvl1pPr marL="0" algn="l" defTabSz="1080130" rtl="0" eaLnBrk="1" latinLnBrk="0" hangingPunct="1">
-        <a:defRPr sz="2200" kern="1200">
+      <a:lvl1pPr marL="0" algn="l" defTabSz="849021" rtl="0" eaLnBrk="1" latinLnBrk="0" hangingPunct="1">
+        <a:defRPr sz="1700" kern="1200">
           <a:solidFill>
             <a:schemeClr val="tx1"/>
           </a:solidFill>
@@ -2993,8 +2993,8 @@
           <a:cs typeface="+mn-cs"/>
         </a:defRPr>
       </a:lvl1pPr>
-      <a:lvl2pPr marL="540064" algn="l" defTabSz="1080130" rtl="0" eaLnBrk="1" latinLnBrk="0" hangingPunct="1">
-        <a:defRPr sz="2200" kern="1200">
+      <a:lvl2pPr marL="424510" algn="l" defTabSz="849021" rtl="0" eaLnBrk="1" latinLnBrk="0" hangingPunct="1">
+        <a:defRPr sz="1700" kern="1200">
           <a:solidFill>
             <a:schemeClr val="tx1"/>
           </a:solidFill>
@@ -3003,8 +3003,8 @@
           <a:cs typeface="+mn-cs"/>
         </a:defRPr>
       </a:lvl2pPr>
-      <a:lvl3pPr marL="1080130" algn="l" defTabSz="1080130" rtl="0" eaLnBrk="1" latinLnBrk="0" hangingPunct="1">
-        <a:defRPr sz="2200" kern="1200">
+      <a:lvl3pPr marL="849021" algn="l" defTabSz="849021" rtl="0" eaLnBrk="1" latinLnBrk="0" hangingPunct="1">
+        <a:defRPr sz="1700" kern="1200">
           <a:solidFill>
             <a:schemeClr val="tx1"/>
           </a:solidFill>
@@ -3013,8 +3013,8 @@
           <a:cs typeface="+mn-cs"/>
         </a:defRPr>
       </a:lvl3pPr>
-      <a:lvl4pPr marL="1620194" algn="l" defTabSz="1080130" rtl="0" eaLnBrk="1" latinLnBrk="0" hangingPunct="1">
-        <a:defRPr sz="2200" kern="1200">
+      <a:lvl4pPr marL="1273532" algn="l" defTabSz="849021" rtl="0" eaLnBrk="1" latinLnBrk="0" hangingPunct="1">
+        <a:defRPr sz="1700" kern="1200">
           <a:solidFill>
             <a:schemeClr val="tx1"/>
           </a:solidFill>
@@ -3023,8 +3023,8 @@
           <a:cs typeface="+mn-cs"/>
         </a:defRPr>
       </a:lvl4pPr>
-      <a:lvl5pPr marL="2160259" algn="l" defTabSz="1080130" rtl="0" eaLnBrk="1" latinLnBrk="0" hangingPunct="1">
-        <a:defRPr sz="2200" kern="1200">
+      <a:lvl5pPr marL="1698043" algn="l" defTabSz="849021" rtl="0" eaLnBrk="1" latinLnBrk="0" hangingPunct="1">
+        <a:defRPr sz="1700" kern="1200">
           <a:solidFill>
             <a:schemeClr val="tx1"/>
           </a:solidFill>
@@ -3033,8 +3033,8 @@
           <a:cs typeface="+mn-cs"/>
         </a:defRPr>
       </a:lvl5pPr>
-      <a:lvl6pPr marL="2700324" algn="l" defTabSz="1080130" rtl="0" eaLnBrk="1" latinLnBrk="0" hangingPunct="1">
-        <a:defRPr sz="2200" kern="1200">
+      <a:lvl6pPr marL="2122553" algn="l" defTabSz="849021" rtl="0" eaLnBrk="1" latinLnBrk="0" hangingPunct="1">
+        <a:defRPr sz="1700" kern="1200">
           <a:solidFill>
             <a:schemeClr val="tx1"/>
           </a:solidFill>
@@ -3043,8 +3043,8 @@
           <a:cs typeface="+mn-cs"/>
         </a:defRPr>
       </a:lvl6pPr>
-      <a:lvl7pPr marL="3240388" algn="l" defTabSz="1080130" rtl="0" eaLnBrk="1" latinLnBrk="0" hangingPunct="1">
-        <a:defRPr sz="2200" kern="1200">
+      <a:lvl7pPr marL="2547063" algn="l" defTabSz="849021" rtl="0" eaLnBrk="1" latinLnBrk="0" hangingPunct="1">
+        <a:defRPr sz="1700" kern="1200">
           <a:solidFill>
             <a:schemeClr val="tx1"/>
           </a:solidFill>
@@ -3053,8 +3053,8 @@
           <a:cs typeface="+mn-cs"/>
         </a:defRPr>
       </a:lvl7pPr>
-      <a:lvl8pPr marL="3780453" algn="l" defTabSz="1080130" rtl="0" eaLnBrk="1" latinLnBrk="0" hangingPunct="1">
-        <a:defRPr sz="2200" kern="1200">
+      <a:lvl8pPr marL="2971574" algn="l" defTabSz="849021" rtl="0" eaLnBrk="1" latinLnBrk="0" hangingPunct="1">
+        <a:defRPr sz="1700" kern="1200">
           <a:solidFill>
             <a:schemeClr val="tx1"/>
           </a:solidFill>
@@ -3063,8 +3063,8 @@
           <a:cs typeface="+mn-cs"/>
         </a:defRPr>
       </a:lvl8pPr>
-      <a:lvl9pPr marL="4320517" algn="l" defTabSz="1080130" rtl="0" eaLnBrk="1" latinLnBrk="0" hangingPunct="1">
-        <a:defRPr sz="2200" kern="1200">
+      <a:lvl9pPr marL="3396083" algn="l" defTabSz="849021" rtl="0" eaLnBrk="1" latinLnBrk="0" hangingPunct="1">
+        <a:defRPr sz="1700" kern="1200">
           <a:solidFill>
             <a:schemeClr val="tx1"/>
           </a:solidFill>
@@ -3097,7 +3097,7 @@
       </p:grpSpPr>
       <p:pic>
         <p:nvPicPr>
-          <p:cNvPr id="10" name="Picture 7"/>
+          <p:cNvPr id="13" name="Picture 6"/>
           <p:cNvPicPr>
             <a:picLocks noChangeAspect="1" noChangeArrowheads="1"/>
           </p:cNvPicPr>
@@ -3118,8 +3118,8 @@
         </p:blipFill>
         <p:spPr bwMode="auto">
           <a:xfrm>
-            <a:off x="-99888" y="-86297"/>
-            <a:ext cx="5230812" cy="9231313"/>
+            <a:off x="-107851" y="-107950"/>
+            <a:ext cx="4230688" cy="7231062"/>
           </a:xfrm>
           <a:prstGeom prst="rect">
             <a:avLst/>
@@ -3128,7 +3128,6 @@
           <a:ln>
             <a:noFill/>
           </a:ln>
-          <a:effectLst/>
           <a:extLst>
             <a:ext uri="{909E8E84-426E-40DD-AFC4-6F175D3DCCD1}">
               <a14:hiddenFill xmlns:a14="http://schemas.microsoft.com/office/drawing/2010/main">
@@ -3146,15 +3145,6 @@
                 <a:headEnd/>
                 <a:tailEnd/>
               </a14:hiddenLine>
-            </a:ext>
-            <a:ext uri="{AF507438-7753-43E0-B8FC-AC1667EBCBE1}">
-              <a14:hiddenEffects xmlns:a14="http://schemas.microsoft.com/office/drawing/2010/main">
-                <a:effectLst>
-                  <a:outerShdw dist="35921" dir="2700000" algn="ctr" rotWithShape="0">
-                    <a:schemeClr val="bg2"/>
-                  </a:outerShdw>
-                </a:effectLst>
-              </a14:hiddenEffects>
             </a:ext>
           </a:extLst>
         </p:spPr>

</xml_diff>

<commit_message>
Chap05: Picture corrections, correction done until dyn under excitation.
</commit_message>
<xml_diff>
--- a/05-CrDyn/Pictures/AutocorPeaks.pptx
+++ b/05-CrDyn/Pictures/AutocorPeaks.pptx
@@ -7,14 +7,14 @@
   <p:sldIdLst>
     <p:sldId id="256" r:id="rId2"/>
   </p:sldIdLst>
-  <p:sldSz cx="3852863" cy="7021513"/>
+  <p:sldSz cx="4752975" cy="8640763"/>
   <p:notesSz cx="6858000" cy="9144000"/>
   <p:defaultTextStyle>
     <a:defPPr>
       <a:defRPr lang="fr-FR"/>
     </a:defPPr>
-    <a:lvl1pPr marL="0" algn="l" defTabSz="849021" rtl="0" eaLnBrk="1" latinLnBrk="0" hangingPunct="1">
-      <a:defRPr sz="1700" kern="1200">
+    <a:lvl1pPr marL="0" algn="l" defTabSz="1068098" rtl="0" eaLnBrk="1" latinLnBrk="0" hangingPunct="1">
+      <a:defRPr sz="2100" kern="1200">
         <a:solidFill>
           <a:schemeClr val="tx1"/>
         </a:solidFill>
@@ -23,8 +23,8 @@
         <a:cs typeface="+mn-cs"/>
       </a:defRPr>
     </a:lvl1pPr>
-    <a:lvl2pPr marL="424510" algn="l" defTabSz="849021" rtl="0" eaLnBrk="1" latinLnBrk="0" hangingPunct="1">
-      <a:defRPr sz="1700" kern="1200">
+    <a:lvl2pPr marL="534048" algn="l" defTabSz="1068098" rtl="0" eaLnBrk="1" latinLnBrk="0" hangingPunct="1">
+      <a:defRPr sz="2100" kern="1200">
         <a:solidFill>
           <a:schemeClr val="tx1"/>
         </a:solidFill>
@@ -33,8 +33,8 @@
         <a:cs typeface="+mn-cs"/>
       </a:defRPr>
     </a:lvl2pPr>
-    <a:lvl3pPr marL="849021" algn="l" defTabSz="849021" rtl="0" eaLnBrk="1" latinLnBrk="0" hangingPunct="1">
-      <a:defRPr sz="1700" kern="1200">
+    <a:lvl3pPr marL="1068098" algn="l" defTabSz="1068098" rtl="0" eaLnBrk="1" latinLnBrk="0" hangingPunct="1">
+      <a:defRPr sz="2100" kern="1200">
         <a:solidFill>
           <a:schemeClr val="tx1"/>
         </a:solidFill>
@@ -43,8 +43,8 @@
         <a:cs typeface="+mn-cs"/>
       </a:defRPr>
     </a:lvl3pPr>
-    <a:lvl4pPr marL="1273532" algn="l" defTabSz="849021" rtl="0" eaLnBrk="1" latinLnBrk="0" hangingPunct="1">
-      <a:defRPr sz="1700" kern="1200">
+    <a:lvl4pPr marL="1602148" algn="l" defTabSz="1068098" rtl="0" eaLnBrk="1" latinLnBrk="0" hangingPunct="1">
+      <a:defRPr sz="2100" kern="1200">
         <a:solidFill>
           <a:schemeClr val="tx1"/>
         </a:solidFill>
@@ -53,8 +53,8 @@
         <a:cs typeface="+mn-cs"/>
       </a:defRPr>
     </a:lvl4pPr>
-    <a:lvl5pPr marL="1698043" algn="l" defTabSz="849021" rtl="0" eaLnBrk="1" latinLnBrk="0" hangingPunct="1">
-      <a:defRPr sz="1700" kern="1200">
+    <a:lvl5pPr marL="2136198" algn="l" defTabSz="1068098" rtl="0" eaLnBrk="1" latinLnBrk="0" hangingPunct="1">
+      <a:defRPr sz="2100" kern="1200">
         <a:solidFill>
           <a:schemeClr val="tx1"/>
         </a:solidFill>
@@ -63,8 +63,8 @@
         <a:cs typeface="+mn-cs"/>
       </a:defRPr>
     </a:lvl5pPr>
-    <a:lvl6pPr marL="2122553" algn="l" defTabSz="849021" rtl="0" eaLnBrk="1" latinLnBrk="0" hangingPunct="1">
-      <a:defRPr sz="1700" kern="1200">
+    <a:lvl6pPr marL="2670246" algn="l" defTabSz="1068098" rtl="0" eaLnBrk="1" latinLnBrk="0" hangingPunct="1">
+      <a:defRPr sz="2100" kern="1200">
         <a:solidFill>
           <a:schemeClr val="tx1"/>
         </a:solidFill>
@@ -73,8 +73,8 @@
         <a:cs typeface="+mn-cs"/>
       </a:defRPr>
     </a:lvl6pPr>
-    <a:lvl7pPr marL="2547063" algn="l" defTabSz="849021" rtl="0" eaLnBrk="1" latinLnBrk="0" hangingPunct="1">
-      <a:defRPr sz="1700" kern="1200">
+    <a:lvl7pPr marL="3204295" algn="l" defTabSz="1068098" rtl="0" eaLnBrk="1" latinLnBrk="0" hangingPunct="1">
+      <a:defRPr sz="2100" kern="1200">
         <a:solidFill>
           <a:schemeClr val="tx1"/>
         </a:solidFill>
@@ -83,8 +83,8 @@
         <a:cs typeface="+mn-cs"/>
       </a:defRPr>
     </a:lvl7pPr>
-    <a:lvl8pPr marL="2971574" algn="l" defTabSz="849021" rtl="0" eaLnBrk="1" latinLnBrk="0" hangingPunct="1">
-      <a:defRPr sz="1700" kern="1200">
+    <a:lvl8pPr marL="3738345" algn="l" defTabSz="1068098" rtl="0" eaLnBrk="1" latinLnBrk="0" hangingPunct="1">
+      <a:defRPr sz="2100" kern="1200">
         <a:solidFill>
           <a:schemeClr val="tx1"/>
         </a:solidFill>
@@ -93,8 +93,8 @@
         <a:cs typeface="+mn-cs"/>
       </a:defRPr>
     </a:lvl8pPr>
-    <a:lvl9pPr marL="3396083" algn="l" defTabSz="849021" rtl="0" eaLnBrk="1" latinLnBrk="0" hangingPunct="1">
-      <a:defRPr sz="1700" kern="1200">
+    <a:lvl9pPr marL="4272393" algn="l" defTabSz="1068098" rtl="0" eaLnBrk="1" latinLnBrk="0" hangingPunct="1">
+      <a:defRPr sz="2100" kern="1200">
         <a:solidFill>
           <a:schemeClr val="tx1"/>
         </a:solidFill>
@@ -136,8 +136,8 @@
         </p:nvSpPr>
         <p:spPr>
           <a:xfrm>
-            <a:off x="288965" y="2181225"/>
-            <a:ext cx="3274933" cy="1505074"/>
+            <a:off x="356475" y="2684244"/>
+            <a:ext cx="4040028" cy="1852162"/>
           </a:xfrm>
         </p:spPr>
         <p:txBody>
@@ -164,8 +164,8 @@
         </p:nvSpPr>
         <p:spPr>
           <a:xfrm>
-            <a:off x="577931" y="3978861"/>
-            <a:ext cx="2697003" cy="1794386"/>
+            <a:off x="712951" y="4896439"/>
+            <a:ext cx="3327081" cy="2208195"/>
           </a:xfrm>
         </p:spPr>
         <p:txBody>
@@ -181,7 +181,7 @@
                 </a:solidFill>
               </a:defRPr>
             </a:lvl1pPr>
-            <a:lvl2pPr marL="424510" indent="0" algn="ctr">
+            <a:lvl2pPr marL="534048" indent="0" algn="ctr">
               <a:buNone/>
               <a:defRPr>
                 <a:solidFill>
@@ -191,7 +191,7 @@
                 </a:solidFill>
               </a:defRPr>
             </a:lvl2pPr>
-            <a:lvl3pPr marL="849021" indent="0" algn="ctr">
+            <a:lvl3pPr marL="1068098" indent="0" algn="ctr">
               <a:buNone/>
               <a:defRPr>
                 <a:solidFill>
@@ -201,7 +201,7 @@
                 </a:solidFill>
               </a:defRPr>
             </a:lvl3pPr>
-            <a:lvl4pPr marL="1273532" indent="0" algn="ctr">
+            <a:lvl4pPr marL="1602148" indent="0" algn="ctr">
               <a:buNone/>
               <a:defRPr>
                 <a:solidFill>
@@ -211,7 +211,7 @@
                 </a:solidFill>
               </a:defRPr>
             </a:lvl4pPr>
-            <a:lvl5pPr marL="1698043" indent="0" algn="ctr">
+            <a:lvl5pPr marL="2136198" indent="0" algn="ctr">
               <a:buNone/>
               <a:defRPr>
                 <a:solidFill>
@@ -221,7 +221,7 @@
                 </a:solidFill>
               </a:defRPr>
             </a:lvl5pPr>
-            <a:lvl6pPr marL="2122553" indent="0" algn="ctr">
+            <a:lvl6pPr marL="2670246" indent="0" algn="ctr">
               <a:buNone/>
               <a:defRPr>
                 <a:solidFill>
@@ -231,7 +231,7 @@
                 </a:solidFill>
               </a:defRPr>
             </a:lvl6pPr>
-            <a:lvl7pPr marL="2547063" indent="0" algn="ctr">
+            <a:lvl7pPr marL="3204295" indent="0" algn="ctr">
               <a:buNone/>
               <a:defRPr>
                 <a:solidFill>
@@ -241,7 +241,7 @@
                 </a:solidFill>
               </a:defRPr>
             </a:lvl7pPr>
-            <a:lvl8pPr marL="2971574" indent="0" algn="ctr">
+            <a:lvl8pPr marL="3738345" indent="0" algn="ctr">
               <a:buNone/>
               <a:defRPr>
                 <a:solidFill>
@@ -251,7 +251,7 @@
                 </a:solidFill>
               </a:defRPr>
             </a:lvl8pPr>
-            <a:lvl9pPr marL="3396083" indent="0" algn="ctr">
+            <a:lvl9pPr marL="4272393" indent="0" algn="ctr">
               <a:buNone/>
               <a:defRPr>
                 <a:solidFill>
@@ -288,7 +288,7 @@
           <a:p>
             <a:fld id="{631F3B9D-D187-4196-BC59-C5BAE8C8D526}" type="datetimeFigureOut">
               <a:rPr lang="fr-FR" smtClean="0"/>
-              <a:t>29/06/2017</a:t>
+              <a:t>19/10/2017</a:t>
             </a:fld>
             <a:endParaRPr lang="fr-FR"/>
           </a:p>
@@ -458,7 +458,7 @@
           <a:p>
             <a:fld id="{631F3B9D-D187-4196-BC59-C5BAE8C8D526}" type="datetimeFigureOut">
               <a:rPr lang="fr-FR" smtClean="0"/>
-              <a:t>29/06/2017</a:t>
+              <a:t>19/10/2017</a:t>
             </a:fld>
             <a:endParaRPr lang="fr-FR"/>
           </a:p>
@@ -548,8 +548,8 @@
         </p:nvSpPr>
         <p:spPr>
           <a:xfrm>
-            <a:off x="2793330" y="281194"/>
-            <a:ext cx="866894" cy="5991041"/>
+            <a:off x="3445913" y="346044"/>
+            <a:ext cx="1069419" cy="7372651"/>
           </a:xfrm>
         </p:spPr>
         <p:txBody>
@@ -576,8 +576,8 @@
         </p:nvSpPr>
         <p:spPr>
           <a:xfrm>
-            <a:off x="192647" y="281194"/>
-            <a:ext cx="2536468" cy="5991041"/>
+            <a:off x="237654" y="346044"/>
+            <a:ext cx="3129042" cy="7372651"/>
           </a:xfrm>
         </p:spPr>
         <p:txBody>
@@ -638,7 +638,7 @@
           <a:p>
             <a:fld id="{631F3B9D-D187-4196-BC59-C5BAE8C8D526}" type="datetimeFigureOut">
               <a:rPr lang="fr-FR" smtClean="0"/>
-              <a:t>29/06/2017</a:t>
+              <a:t>19/10/2017</a:t>
             </a:fld>
             <a:endParaRPr lang="fr-FR"/>
           </a:p>
@@ -808,7 +808,7 @@
           <a:p>
             <a:fld id="{631F3B9D-D187-4196-BC59-C5BAE8C8D526}" type="datetimeFigureOut">
               <a:rPr lang="fr-FR" smtClean="0"/>
-              <a:t>29/06/2017</a:t>
+              <a:t>19/10/2017</a:t>
             </a:fld>
             <a:endParaRPr lang="fr-FR"/>
           </a:p>
@@ -898,15 +898,15 @@
         </p:nvSpPr>
         <p:spPr>
           <a:xfrm>
-            <a:off x="304351" y="4511976"/>
-            <a:ext cx="3274933" cy="1394551"/>
+            <a:off x="375457" y="5552496"/>
+            <a:ext cx="4040028" cy="1716152"/>
           </a:xfrm>
         </p:spPr>
         <p:txBody>
           <a:bodyPr anchor="t"/>
           <a:lstStyle>
             <a:lvl1pPr algn="l">
-              <a:defRPr sz="3800" b="1" cap="all"/>
+              <a:defRPr sz="4800" b="1" cap="all"/>
             </a:lvl1pPr>
           </a:lstStyle>
           <a:p>
@@ -930,8 +930,8 @@
         </p:nvSpPr>
         <p:spPr>
           <a:xfrm>
-            <a:off x="304351" y="2976024"/>
-            <a:ext cx="3274933" cy="1535955"/>
+            <a:off x="375457" y="3662337"/>
+            <a:ext cx="4040028" cy="1890165"/>
           </a:xfrm>
         </p:spPr>
         <p:txBody>
@@ -939,7 +939,7 @@
           <a:lstStyle>
             <a:lvl1pPr marL="0" indent="0">
               <a:buNone/>
-              <a:defRPr sz="1800">
+              <a:defRPr sz="2300">
                 <a:solidFill>
                   <a:schemeClr val="tx1">
                     <a:tint val="75000"/>
@@ -947,7 +947,27 @@
                 </a:solidFill>
               </a:defRPr>
             </a:lvl1pPr>
-            <a:lvl2pPr marL="424510" indent="0">
+            <a:lvl2pPr marL="534048" indent="0">
+              <a:buNone/>
+              <a:defRPr sz="2100">
+                <a:solidFill>
+                  <a:schemeClr val="tx1">
+                    <a:tint val="75000"/>
+                  </a:schemeClr>
+                </a:solidFill>
+              </a:defRPr>
+            </a:lvl2pPr>
+            <a:lvl3pPr marL="1068098" indent="0">
+              <a:buNone/>
+              <a:defRPr sz="1900">
+                <a:solidFill>
+                  <a:schemeClr val="tx1">
+                    <a:tint val="75000"/>
+                  </a:schemeClr>
+                </a:solidFill>
+              </a:defRPr>
+            </a:lvl3pPr>
+            <a:lvl4pPr marL="1602148" indent="0">
               <a:buNone/>
               <a:defRPr sz="1700">
                 <a:solidFill>
@@ -956,30 +976,10 @@
                   </a:schemeClr>
                 </a:solidFill>
               </a:defRPr>
-            </a:lvl2pPr>
-            <a:lvl3pPr marL="849021" indent="0">
-              <a:buNone/>
-              <a:defRPr sz="1500">
-                <a:solidFill>
-                  <a:schemeClr val="tx1">
-                    <a:tint val="75000"/>
-                  </a:schemeClr>
-                </a:solidFill>
-              </a:defRPr>
-            </a:lvl3pPr>
-            <a:lvl4pPr marL="1273532" indent="0">
-              <a:buNone/>
-              <a:defRPr sz="1300">
-                <a:solidFill>
-                  <a:schemeClr val="tx1">
-                    <a:tint val="75000"/>
-                  </a:schemeClr>
-                </a:solidFill>
-              </a:defRPr>
             </a:lvl4pPr>
-            <a:lvl5pPr marL="1698043" indent="0">
-              <a:buNone/>
-              <a:defRPr sz="1300">
+            <a:lvl5pPr marL="2136198" indent="0">
+              <a:buNone/>
+              <a:defRPr sz="1700">
                 <a:solidFill>
                   <a:schemeClr val="tx1">
                     <a:tint val="75000"/>
@@ -987,9 +987,9 @@
                 </a:solidFill>
               </a:defRPr>
             </a:lvl5pPr>
-            <a:lvl6pPr marL="2122553" indent="0">
-              <a:buNone/>
-              <a:defRPr sz="1300">
+            <a:lvl6pPr marL="2670246" indent="0">
+              <a:buNone/>
+              <a:defRPr sz="1700">
                 <a:solidFill>
                   <a:schemeClr val="tx1">
                     <a:tint val="75000"/>
@@ -997,9 +997,9 @@
                 </a:solidFill>
               </a:defRPr>
             </a:lvl6pPr>
-            <a:lvl7pPr marL="2547063" indent="0">
-              <a:buNone/>
-              <a:defRPr sz="1300">
+            <a:lvl7pPr marL="3204295" indent="0">
+              <a:buNone/>
+              <a:defRPr sz="1700">
                 <a:solidFill>
                   <a:schemeClr val="tx1">
                     <a:tint val="75000"/>
@@ -1007,9 +1007,9 @@
                 </a:solidFill>
               </a:defRPr>
             </a:lvl7pPr>
-            <a:lvl8pPr marL="2971574" indent="0">
-              <a:buNone/>
-              <a:defRPr sz="1300">
+            <a:lvl8pPr marL="3738345" indent="0">
+              <a:buNone/>
+              <a:defRPr sz="1700">
                 <a:solidFill>
                   <a:schemeClr val="tx1">
                     <a:tint val="75000"/>
@@ -1017,9 +1017,9 @@
                 </a:solidFill>
               </a:defRPr>
             </a:lvl8pPr>
-            <a:lvl9pPr marL="3396083" indent="0">
-              <a:buNone/>
-              <a:defRPr sz="1300">
+            <a:lvl9pPr marL="4272393" indent="0">
+              <a:buNone/>
+              <a:defRPr sz="1700">
                 <a:solidFill>
                   <a:schemeClr val="tx1">
                     <a:tint val="75000"/>
@@ -1054,7 +1054,7 @@
           <a:p>
             <a:fld id="{631F3B9D-D187-4196-BC59-C5BAE8C8D526}" type="datetimeFigureOut">
               <a:rPr lang="fr-FR" smtClean="0"/>
-              <a:t>29/06/2017</a:t>
+              <a:t>19/10/2017</a:t>
             </a:fld>
             <a:endParaRPr lang="fr-FR"/>
           </a:p>
@@ -1167,39 +1167,39 @@
         </p:nvSpPr>
         <p:spPr>
           <a:xfrm>
-            <a:off x="192646" y="1638356"/>
-            <a:ext cx="1701681" cy="4633874"/>
+            <a:off x="237652" y="2016182"/>
+            <a:ext cx="2099231" cy="5702504"/>
           </a:xfrm>
         </p:spPr>
         <p:txBody>
           <a:bodyPr/>
           <a:lstStyle>
             <a:lvl1pPr>
-              <a:defRPr sz="2700"/>
+              <a:defRPr sz="3400"/>
             </a:lvl1pPr>
             <a:lvl2pPr>
-              <a:defRPr sz="2200"/>
+              <a:defRPr sz="2700"/>
             </a:lvl2pPr>
             <a:lvl3pPr>
-              <a:defRPr sz="1800"/>
+              <a:defRPr sz="2300"/>
             </a:lvl3pPr>
             <a:lvl4pPr>
-              <a:defRPr sz="1700"/>
+              <a:defRPr sz="2100"/>
             </a:lvl4pPr>
             <a:lvl5pPr>
-              <a:defRPr sz="1700"/>
+              <a:defRPr sz="2100"/>
             </a:lvl5pPr>
             <a:lvl6pPr>
-              <a:defRPr sz="1700"/>
+              <a:defRPr sz="2100"/>
             </a:lvl6pPr>
             <a:lvl7pPr>
-              <a:defRPr sz="1700"/>
+              <a:defRPr sz="2100"/>
             </a:lvl7pPr>
             <a:lvl8pPr>
-              <a:defRPr sz="1700"/>
+              <a:defRPr sz="2100"/>
             </a:lvl8pPr>
             <a:lvl9pPr>
-              <a:defRPr sz="1700"/>
+              <a:defRPr sz="2100"/>
             </a:lvl9pPr>
           </a:lstStyle>
           <a:p>
@@ -1252,39 +1252,39 @@
         </p:nvSpPr>
         <p:spPr>
           <a:xfrm>
-            <a:off x="1958542" y="1638356"/>
-            <a:ext cx="1701681" cy="4633874"/>
+            <a:off x="2416102" y="2016182"/>
+            <a:ext cx="2099231" cy="5702504"/>
           </a:xfrm>
         </p:spPr>
         <p:txBody>
           <a:bodyPr/>
           <a:lstStyle>
             <a:lvl1pPr>
-              <a:defRPr sz="2700"/>
+              <a:defRPr sz="3400"/>
             </a:lvl1pPr>
             <a:lvl2pPr>
-              <a:defRPr sz="2200"/>
+              <a:defRPr sz="2700"/>
             </a:lvl2pPr>
             <a:lvl3pPr>
-              <a:defRPr sz="1800"/>
+              <a:defRPr sz="2300"/>
             </a:lvl3pPr>
             <a:lvl4pPr>
-              <a:defRPr sz="1700"/>
+              <a:defRPr sz="2100"/>
             </a:lvl4pPr>
             <a:lvl5pPr>
-              <a:defRPr sz="1700"/>
+              <a:defRPr sz="2100"/>
             </a:lvl5pPr>
             <a:lvl6pPr>
-              <a:defRPr sz="1700"/>
+              <a:defRPr sz="2100"/>
             </a:lvl6pPr>
             <a:lvl7pPr>
-              <a:defRPr sz="1700"/>
+              <a:defRPr sz="2100"/>
             </a:lvl7pPr>
             <a:lvl8pPr>
-              <a:defRPr sz="1700"/>
+              <a:defRPr sz="2100"/>
             </a:lvl8pPr>
             <a:lvl9pPr>
-              <a:defRPr sz="1700"/>
+              <a:defRPr sz="2100"/>
             </a:lvl9pPr>
           </a:lstStyle>
           <a:p>
@@ -1342,7 +1342,7 @@
           <a:p>
             <a:fld id="{631F3B9D-D187-4196-BC59-C5BAE8C8D526}" type="datetimeFigureOut">
               <a:rPr lang="fr-FR" smtClean="0"/>
-              <a:t>29/06/2017</a:t>
+              <a:t>19/10/2017</a:t>
             </a:fld>
             <a:endParaRPr lang="fr-FR"/>
           </a:p>
@@ -1459,8 +1459,8 @@
         </p:nvSpPr>
         <p:spPr>
           <a:xfrm>
-            <a:off x="192646" y="1571721"/>
-            <a:ext cx="1702350" cy="655015"/>
+            <a:off x="237653" y="1934182"/>
+            <a:ext cx="2100055" cy="806070"/>
           </a:xfrm>
         </p:spPr>
         <p:txBody>
@@ -1468,39 +1468,39 @@
           <a:lstStyle>
             <a:lvl1pPr marL="0" indent="0">
               <a:buNone/>
-              <a:defRPr sz="2200" b="1"/>
+              <a:defRPr sz="2700" b="1"/>
             </a:lvl1pPr>
-            <a:lvl2pPr marL="424510" indent="0">
-              <a:buNone/>
-              <a:defRPr sz="1800" b="1"/>
+            <a:lvl2pPr marL="534048" indent="0">
+              <a:buNone/>
+              <a:defRPr sz="2300" b="1"/>
             </a:lvl2pPr>
-            <a:lvl3pPr marL="849021" indent="0">
-              <a:buNone/>
-              <a:defRPr sz="1700" b="1"/>
+            <a:lvl3pPr marL="1068098" indent="0">
+              <a:buNone/>
+              <a:defRPr sz="2100" b="1"/>
             </a:lvl3pPr>
-            <a:lvl4pPr marL="1273532" indent="0">
-              <a:buNone/>
-              <a:defRPr sz="1500" b="1"/>
+            <a:lvl4pPr marL="1602148" indent="0">
+              <a:buNone/>
+              <a:defRPr sz="1900" b="1"/>
             </a:lvl4pPr>
-            <a:lvl5pPr marL="1698043" indent="0">
-              <a:buNone/>
-              <a:defRPr sz="1500" b="1"/>
+            <a:lvl5pPr marL="2136198" indent="0">
+              <a:buNone/>
+              <a:defRPr sz="1900" b="1"/>
             </a:lvl5pPr>
-            <a:lvl6pPr marL="2122553" indent="0">
-              <a:buNone/>
-              <a:defRPr sz="1500" b="1"/>
+            <a:lvl6pPr marL="2670246" indent="0">
+              <a:buNone/>
+              <a:defRPr sz="1900" b="1"/>
             </a:lvl6pPr>
-            <a:lvl7pPr marL="2547063" indent="0">
-              <a:buNone/>
-              <a:defRPr sz="1500" b="1"/>
+            <a:lvl7pPr marL="3204295" indent="0">
+              <a:buNone/>
+              <a:defRPr sz="1900" b="1"/>
             </a:lvl7pPr>
-            <a:lvl8pPr marL="2971574" indent="0">
-              <a:buNone/>
-              <a:defRPr sz="1500" b="1"/>
+            <a:lvl8pPr marL="3738345" indent="0">
+              <a:buNone/>
+              <a:defRPr sz="1900" b="1"/>
             </a:lvl8pPr>
-            <a:lvl9pPr marL="3396083" indent="0">
-              <a:buNone/>
-              <a:defRPr sz="1500" b="1"/>
+            <a:lvl9pPr marL="4272393" indent="0">
+              <a:buNone/>
+              <a:defRPr sz="1900" b="1"/>
             </a:lvl9pPr>
           </a:lstStyle>
           <a:p>
@@ -1524,39 +1524,39 @@
         </p:nvSpPr>
         <p:spPr>
           <a:xfrm>
-            <a:off x="192646" y="2226738"/>
-            <a:ext cx="1702350" cy="4045497"/>
+            <a:off x="237653" y="2740253"/>
+            <a:ext cx="2100055" cy="4978440"/>
           </a:xfrm>
         </p:spPr>
         <p:txBody>
           <a:bodyPr/>
           <a:lstStyle>
             <a:lvl1pPr>
-              <a:defRPr sz="2200"/>
+              <a:defRPr sz="2700"/>
             </a:lvl1pPr>
             <a:lvl2pPr>
-              <a:defRPr sz="1800"/>
+              <a:defRPr sz="2300"/>
             </a:lvl2pPr>
             <a:lvl3pPr>
-              <a:defRPr sz="1700"/>
+              <a:defRPr sz="2100"/>
             </a:lvl3pPr>
             <a:lvl4pPr>
-              <a:defRPr sz="1500"/>
+              <a:defRPr sz="1900"/>
             </a:lvl4pPr>
             <a:lvl5pPr>
-              <a:defRPr sz="1500"/>
+              <a:defRPr sz="1900"/>
             </a:lvl5pPr>
             <a:lvl6pPr>
-              <a:defRPr sz="1500"/>
+              <a:defRPr sz="1900"/>
             </a:lvl6pPr>
             <a:lvl7pPr>
-              <a:defRPr sz="1500"/>
+              <a:defRPr sz="1900"/>
             </a:lvl7pPr>
             <a:lvl8pPr>
-              <a:defRPr sz="1500"/>
+              <a:defRPr sz="1900"/>
             </a:lvl8pPr>
             <a:lvl9pPr>
-              <a:defRPr sz="1500"/>
+              <a:defRPr sz="1900"/>
             </a:lvl9pPr>
           </a:lstStyle>
           <a:p>
@@ -1609,8 +1609,8 @@
         </p:nvSpPr>
         <p:spPr>
           <a:xfrm>
-            <a:off x="1957203" y="1571721"/>
-            <a:ext cx="1703018" cy="655015"/>
+            <a:off x="2414448" y="1934182"/>
+            <a:ext cx="2100880" cy="806070"/>
           </a:xfrm>
         </p:spPr>
         <p:txBody>
@@ -1618,39 +1618,39 @@
           <a:lstStyle>
             <a:lvl1pPr marL="0" indent="0">
               <a:buNone/>
-              <a:defRPr sz="2200" b="1"/>
+              <a:defRPr sz="2700" b="1"/>
             </a:lvl1pPr>
-            <a:lvl2pPr marL="424510" indent="0">
-              <a:buNone/>
-              <a:defRPr sz="1800" b="1"/>
+            <a:lvl2pPr marL="534048" indent="0">
+              <a:buNone/>
+              <a:defRPr sz="2300" b="1"/>
             </a:lvl2pPr>
-            <a:lvl3pPr marL="849021" indent="0">
-              <a:buNone/>
-              <a:defRPr sz="1700" b="1"/>
+            <a:lvl3pPr marL="1068098" indent="0">
+              <a:buNone/>
+              <a:defRPr sz="2100" b="1"/>
             </a:lvl3pPr>
-            <a:lvl4pPr marL="1273532" indent="0">
-              <a:buNone/>
-              <a:defRPr sz="1500" b="1"/>
+            <a:lvl4pPr marL="1602148" indent="0">
+              <a:buNone/>
+              <a:defRPr sz="1900" b="1"/>
             </a:lvl4pPr>
-            <a:lvl5pPr marL="1698043" indent="0">
-              <a:buNone/>
-              <a:defRPr sz="1500" b="1"/>
+            <a:lvl5pPr marL="2136198" indent="0">
+              <a:buNone/>
+              <a:defRPr sz="1900" b="1"/>
             </a:lvl5pPr>
-            <a:lvl6pPr marL="2122553" indent="0">
-              <a:buNone/>
-              <a:defRPr sz="1500" b="1"/>
+            <a:lvl6pPr marL="2670246" indent="0">
+              <a:buNone/>
+              <a:defRPr sz="1900" b="1"/>
             </a:lvl6pPr>
-            <a:lvl7pPr marL="2547063" indent="0">
-              <a:buNone/>
-              <a:defRPr sz="1500" b="1"/>
+            <a:lvl7pPr marL="3204295" indent="0">
+              <a:buNone/>
+              <a:defRPr sz="1900" b="1"/>
             </a:lvl7pPr>
-            <a:lvl8pPr marL="2971574" indent="0">
-              <a:buNone/>
-              <a:defRPr sz="1500" b="1"/>
+            <a:lvl8pPr marL="3738345" indent="0">
+              <a:buNone/>
+              <a:defRPr sz="1900" b="1"/>
             </a:lvl8pPr>
-            <a:lvl9pPr marL="3396083" indent="0">
-              <a:buNone/>
-              <a:defRPr sz="1500" b="1"/>
+            <a:lvl9pPr marL="4272393" indent="0">
+              <a:buNone/>
+              <a:defRPr sz="1900" b="1"/>
             </a:lvl9pPr>
           </a:lstStyle>
           <a:p>
@@ -1674,39 +1674,39 @@
         </p:nvSpPr>
         <p:spPr>
           <a:xfrm>
-            <a:off x="1957203" y="2226738"/>
-            <a:ext cx="1703018" cy="4045497"/>
+            <a:off x="2414448" y="2740253"/>
+            <a:ext cx="2100880" cy="4978440"/>
           </a:xfrm>
         </p:spPr>
         <p:txBody>
           <a:bodyPr/>
           <a:lstStyle>
             <a:lvl1pPr>
-              <a:defRPr sz="2200"/>
+              <a:defRPr sz="2700"/>
             </a:lvl1pPr>
             <a:lvl2pPr>
-              <a:defRPr sz="1800"/>
+              <a:defRPr sz="2300"/>
             </a:lvl2pPr>
             <a:lvl3pPr>
-              <a:defRPr sz="1700"/>
+              <a:defRPr sz="2100"/>
             </a:lvl3pPr>
             <a:lvl4pPr>
-              <a:defRPr sz="1500"/>
+              <a:defRPr sz="1900"/>
             </a:lvl4pPr>
             <a:lvl5pPr>
-              <a:defRPr sz="1500"/>
+              <a:defRPr sz="1900"/>
             </a:lvl5pPr>
             <a:lvl6pPr>
-              <a:defRPr sz="1500"/>
+              <a:defRPr sz="1900"/>
             </a:lvl6pPr>
             <a:lvl7pPr>
-              <a:defRPr sz="1500"/>
+              <a:defRPr sz="1900"/>
             </a:lvl7pPr>
             <a:lvl8pPr>
-              <a:defRPr sz="1500"/>
+              <a:defRPr sz="1900"/>
             </a:lvl8pPr>
             <a:lvl9pPr>
-              <a:defRPr sz="1500"/>
+              <a:defRPr sz="1900"/>
             </a:lvl9pPr>
           </a:lstStyle>
           <a:p>
@@ -1764,7 +1764,7 @@
           <a:p>
             <a:fld id="{631F3B9D-D187-4196-BC59-C5BAE8C8D526}" type="datetimeFigureOut">
               <a:rPr lang="fr-FR" smtClean="0"/>
-              <a:t>29/06/2017</a:t>
+              <a:t>19/10/2017</a:t>
             </a:fld>
             <a:endParaRPr lang="fr-FR"/>
           </a:p>
@@ -1882,7 +1882,7 @@
           <a:p>
             <a:fld id="{631F3B9D-D187-4196-BC59-C5BAE8C8D526}" type="datetimeFigureOut">
               <a:rPr lang="fr-FR" smtClean="0"/>
-              <a:t>29/06/2017</a:t>
+              <a:t>19/10/2017</a:t>
             </a:fld>
             <a:endParaRPr lang="fr-FR"/>
           </a:p>
@@ -1977,7 +1977,7 @@
           <a:p>
             <a:fld id="{631F3B9D-D187-4196-BC59-C5BAE8C8D526}" type="datetimeFigureOut">
               <a:rPr lang="fr-FR" smtClean="0"/>
-              <a:t>29/06/2017</a:t>
+              <a:t>19/10/2017</a:t>
             </a:fld>
             <a:endParaRPr lang="fr-FR"/>
           </a:p>
@@ -2067,15 +2067,15 @@
         </p:nvSpPr>
         <p:spPr>
           <a:xfrm>
-            <a:off x="192646" y="279567"/>
-            <a:ext cx="1267565" cy="1189757"/>
+            <a:off x="237654" y="344040"/>
+            <a:ext cx="1563696" cy="1464130"/>
           </a:xfrm>
         </p:spPr>
         <p:txBody>
           <a:bodyPr anchor="b"/>
           <a:lstStyle>
             <a:lvl1pPr algn="l">
-              <a:defRPr sz="1800" b="1"/>
+              <a:defRPr sz="2300" b="1"/>
             </a:lvl1pPr>
           </a:lstStyle>
           <a:p>
@@ -2099,39 +2099,39 @@
         </p:nvSpPr>
         <p:spPr>
           <a:xfrm>
-            <a:off x="1506366" y="279565"/>
-            <a:ext cx="2153857" cy="5992666"/>
+            <a:off x="1858287" y="344038"/>
+            <a:ext cx="2657045" cy="7374651"/>
           </a:xfrm>
         </p:spPr>
         <p:txBody>
           <a:bodyPr/>
           <a:lstStyle>
             <a:lvl1pPr>
-              <a:defRPr sz="3100"/>
+              <a:defRPr sz="3900"/>
             </a:lvl1pPr>
             <a:lvl2pPr>
-              <a:defRPr sz="2700"/>
+              <a:defRPr sz="3400"/>
             </a:lvl2pPr>
             <a:lvl3pPr>
-              <a:defRPr sz="2200"/>
+              <a:defRPr sz="2700"/>
             </a:lvl3pPr>
             <a:lvl4pPr>
-              <a:defRPr sz="1800"/>
+              <a:defRPr sz="2300"/>
             </a:lvl4pPr>
             <a:lvl5pPr>
-              <a:defRPr sz="1800"/>
+              <a:defRPr sz="2300"/>
             </a:lvl5pPr>
             <a:lvl6pPr>
-              <a:defRPr sz="1800"/>
+              <a:defRPr sz="2300"/>
             </a:lvl6pPr>
             <a:lvl7pPr>
-              <a:defRPr sz="1800"/>
+              <a:defRPr sz="2300"/>
             </a:lvl7pPr>
             <a:lvl8pPr>
-              <a:defRPr sz="1800"/>
+              <a:defRPr sz="2300"/>
             </a:lvl8pPr>
             <a:lvl9pPr>
-              <a:defRPr sz="1800"/>
+              <a:defRPr sz="2300"/>
             </a:lvl9pPr>
           </a:lstStyle>
           <a:p>
@@ -2184,8 +2184,8 @@
         </p:nvSpPr>
         <p:spPr>
           <a:xfrm>
-            <a:off x="192646" y="1469319"/>
-            <a:ext cx="1267565" cy="4802912"/>
+            <a:off x="237654" y="1808163"/>
+            <a:ext cx="1563696" cy="5910524"/>
           </a:xfrm>
         </p:spPr>
         <p:txBody>
@@ -2193,39 +2193,39 @@
           <a:lstStyle>
             <a:lvl1pPr marL="0" indent="0">
               <a:buNone/>
-              <a:defRPr sz="1300"/>
+              <a:defRPr sz="1700"/>
             </a:lvl1pPr>
-            <a:lvl2pPr marL="424510" indent="0">
-              <a:buNone/>
-              <a:defRPr sz="1200"/>
+            <a:lvl2pPr marL="534048" indent="0">
+              <a:buNone/>
+              <a:defRPr sz="1500"/>
             </a:lvl2pPr>
-            <a:lvl3pPr marL="849021" indent="0">
-              <a:buNone/>
-              <a:defRPr sz="900"/>
+            <a:lvl3pPr marL="1068098" indent="0">
+              <a:buNone/>
+              <a:defRPr sz="1100"/>
             </a:lvl3pPr>
-            <a:lvl4pPr marL="1273532" indent="0">
-              <a:buNone/>
-              <a:defRPr sz="900"/>
+            <a:lvl4pPr marL="1602148" indent="0">
+              <a:buNone/>
+              <a:defRPr sz="1100"/>
             </a:lvl4pPr>
-            <a:lvl5pPr marL="1698043" indent="0">
-              <a:buNone/>
-              <a:defRPr sz="900"/>
+            <a:lvl5pPr marL="2136198" indent="0">
+              <a:buNone/>
+              <a:defRPr sz="1100"/>
             </a:lvl5pPr>
-            <a:lvl6pPr marL="2122553" indent="0">
-              <a:buNone/>
-              <a:defRPr sz="900"/>
+            <a:lvl6pPr marL="2670246" indent="0">
+              <a:buNone/>
+              <a:defRPr sz="1100"/>
             </a:lvl6pPr>
-            <a:lvl7pPr marL="2547063" indent="0">
-              <a:buNone/>
-              <a:defRPr sz="900"/>
+            <a:lvl7pPr marL="3204295" indent="0">
+              <a:buNone/>
+              <a:defRPr sz="1100"/>
             </a:lvl7pPr>
-            <a:lvl8pPr marL="2971574" indent="0">
-              <a:buNone/>
-              <a:defRPr sz="900"/>
+            <a:lvl8pPr marL="3738345" indent="0">
+              <a:buNone/>
+              <a:defRPr sz="1100"/>
             </a:lvl8pPr>
-            <a:lvl9pPr marL="3396083" indent="0">
-              <a:buNone/>
-              <a:defRPr sz="900"/>
+            <a:lvl9pPr marL="4272393" indent="0">
+              <a:buNone/>
+              <a:defRPr sz="1100"/>
             </a:lvl9pPr>
           </a:lstStyle>
           <a:p>
@@ -2254,7 +2254,7 @@
           <a:p>
             <a:fld id="{631F3B9D-D187-4196-BC59-C5BAE8C8D526}" type="datetimeFigureOut">
               <a:rPr lang="fr-FR" smtClean="0"/>
-              <a:t>29/06/2017</a:t>
+              <a:t>19/10/2017</a:t>
             </a:fld>
             <a:endParaRPr lang="fr-FR"/>
           </a:p>
@@ -2344,15 +2344,15 @@
         </p:nvSpPr>
         <p:spPr>
           <a:xfrm>
-            <a:off x="755192" y="4915066"/>
-            <a:ext cx="2311718" cy="580251"/>
+            <a:off x="931623" y="6048544"/>
+            <a:ext cx="2851785" cy="714064"/>
           </a:xfrm>
         </p:spPr>
         <p:txBody>
           <a:bodyPr anchor="b"/>
           <a:lstStyle>
             <a:lvl1pPr algn="l">
-              <a:defRPr sz="1800" b="1"/>
+              <a:defRPr sz="2300" b="1"/>
             </a:lvl1pPr>
           </a:lstStyle>
           <a:p>
@@ -2376,8 +2376,8 @@
         </p:nvSpPr>
         <p:spPr>
           <a:xfrm>
-            <a:off x="755192" y="627390"/>
-            <a:ext cx="2311718" cy="4212908"/>
+            <a:off x="931623" y="772074"/>
+            <a:ext cx="2851785" cy="5184458"/>
           </a:xfrm>
         </p:spPr>
         <p:txBody>
@@ -2385,39 +2385,39 @@
           <a:lstStyle>
             <a:lvl1pPr marL="0" indent="0">
               <a:buNone/>
-              <a:defRPr sz="3100"/>
+              <a:defRPr sz="3900"/>
             </a:lvl1pPr>
-            <a:lvl2pPr marL="424510" indent="0">
+            <a:lvl2pPr marL="534048" indent="0">
+              <a:buNone/>
+              <a:defRPr sz="3400"/>
+            </a:lvl2pPr>
+            <a:lvl3pPr marL="1068098" indent="0">
               <a:buNone/>
               <a:defRPr sz="2700"/>
-            </a:lvl2pPr>
-            <a:lvl3pPr marL="849021" indent="0">
-              <a:buNone/>
-              <a:defRPr sz="2200"/>
             </a:lvl3pPr>
-            <a:lvl4pPr marL="1273532" indent="0">
-              <a:buNone/>
-              <a:defRPr sz="1800"/>
+            <a:lvl4pPr marL="1602148" indent="0">
+              <a:buNone/>
+              <a:defRPr sz="2300"/>
             </a:lvl4pPr>
-            <a:lvl5pPr marL="1698043" indent="0">
-              <a:buNone/>
-              <a:defRPr sz="1800"/>
+            <a:lvl5pPr marL="2136198" indent="0">
+              <a:buNone/>
+              <a:defRPr sz="2300"/>
             </a:lvl5pPr>
-            <a:lvl6pPr marL="2122553" indent="0">
-              <a:buNone/>
-              <a:defRPr sz="1800"/>
+            <a:lvl6pPr marL="2670246" indent="0">
+              <a:buNone/>
+              <a:defRPr sz="2300"/>
             </a:lvl6pPr>
-            <a:lvl7pPr marL="2547063" indent="0">
-              <a:buNone/>
-              <a:defRPr sz="1800"/>
+            <a:lvl7pPr marL="3204295" indent="0">
+              <a:buNone/>
+              <a:defRPr sz="2300"/>
             </a:lvl7pPr>
-            <a:lvl8pPr marL="2971574" indent="0">
-              <a:buNone/>
-              <a:defRPr sz="1800"/>
+            <a:lvl8pPr marL="3738345" indent="0">
+              <a:buNone/>
+              <a:defRPr sz="2300"/>
             </a:lvl8pPr>
-            <a:lvl9pPr marL="3396083" indent="0">
-              <a:buNone/>
-              <a:defRPr sz="1800"/>
+            <a:lvl9pPr marL="4272393" indent="0">
+              <a:buNone/>
+              <a:defRPr sz="2300"/>
             </a:lvl9pPr>
           </a:lstStyle>
           <a:p>
@@ -2437,8 +2437,8 @@
         </p:nvSpPr>
         <p:spPr>
           <a:xfrm>
-            <a:off x="755192" y="5495314"/>
-            <a:ext cx="2311718" cy="824053"/>
+            <a:off x="931623" y="6762605"/>
+            <a:ext cx="2851785" cy="1014091"/>
           </a:xfrm>
         </p:spPr>
         <p:txBody>
@@ -2446,39 +2446,39 @@
           <a:lstStyle>
             <a:lvl1pPr marL="0" indent="0">
               <a:buNone/>
-              <a:defRPr sz="1300"/>
+              <a:defRPr sz="1700"/>
             </a:lvl1pPr>
-            <a:lvl2pPr marL="424510" indent="0">
-              <a:buNone/>
-              <a:defRPr sz="1200"/>
+            <a:lvl2pPr marL="534048" indent="0">
+              <a:buNone/>
+              <a:defRPr sz="1500"/>
             </a:lvl2pPr>
-            <a:lvl3pPr marL="849021" indent="0">
-              <a:buNone/>
-              <a:defRPr sz="900"/>
+            <a:lvl3pPr marL="1068098" indent="0">
+              <a:buNone/>
+              <a:defRPr sz="1100"/>
             </a:lvl3pPr>
-            <a:lvl4pPr marL="1273532" indent="0">
-              <a:buNone/>
-              <a:defRPr sz="900"/>
+            <a:lvl4pPr marL="1602148" indent="0">
+              <a:buNone/>
+              <a:defRPr sz="1100"/>
             </a:lvl4pPr>
-            <a:lvl5pPr marL="1698043" indent="0">
-              <a:buNone/>
-              <a:defRPr sz="900"/>
+            <a:lvl5pPr marL="2136198" indent="0">
+              <a:buNone/>
+              <a:defRPr sz="1100"/>
             </a:lvl5pPr>
-            <a:lvl6pPr marL="2122553" indent="0">
-              <a:buNone/>
-              <a:defRPr sz="900"/>
+            <a:lvl6pPr marL="2670246" indent="0">
+              <a:buNone/>
+              <a:defRPr sz="1100"/>
             </a:lvl6pPr>
-            <a:lvl7pPr marL="2547063" indent="0">
-              <a:buNone/>
-              <a:defRPr sz="900"/>
+            <a:lvl7pPr marL="3204295" indent="0">
+              <a:buNone/>
+              <a:defRPr sz="1100"/>
             </a:lvl7pPr>
-            <a:lvl8pPr marL="2971574" indent="0">
-              <a:buNone/>
-              <a:defRPr sz="900"/>
+            <a:lvl8pPr marL="3738345" indent="0">
+              <a:buNone/>
+              <a:defRPr sz="1100"/>
             </a:lvl8pPr>
-            <a:lvl9pPr marL="3396083" indent="0">
-              <a:buNone/>
-              <a:defRPr sz="900"/>
+            <a:lvl9pPr marL="4272393" indent="0">
+              <a:buNone/>
+              <a:defRPr sz="1100"/>
             </a:lvl9pPr>
           </a:lstStyle>
           <a:p>
@@ -2507,7 +2507,7 @@
           <a:p>
             <a:fld id="{631F3B9D-D187-4196-BC59-C5BAE8C8D526}" type="datetimeFigureOut">
               <a:rPr lang="fr-FR" smtClean="0"/>
-              <a:t>29/06/2017</a:t>
+              <a:t>19/10/2017</a:t>
             </a:fld>
             <a:endParaRPr lang="fr-FR"/>
           </a:p>
@@ -2602,15 +2602,15 @@
         </p:nvSpPr>
         <p:spPr>
           <a:xfrm>
-            <a:off x="192648" y="281190"/>
-            <a:ext cx="3467576" cy="1170253"/>
+            <a:off x="237656" y="346039"/>
+            <a:ext cx="4277677" cy="1440129"/>
           </a:xfrm>
           <a:prstGeom prst="rect">
             <a:avLst/>
           </a:prstGeom>
         </p:spPr>
         <p:txBody>
-          <a:bodyPr vert="horz" lIns="84902" tIns="42450" rIns="84902" bIns="42450" rtlCol="0" anchor="ctr">
+          <a:bodyPr vert="horz" lIns="106809" tIns="53404" rIns="106809" bIns="53404" rtlCol="0" anchor="ctr">
             <a:normAutofit/>
           </a:bodyPr>
           <a:lstStyle/>
@@ -2635,15 +2635,15 @@
         </p:nvSpPr>
         <p:spPr>
           <a:xfrm>
-            <a:off x="192648" y="1638356"/>
-            <a:ext cx="3467576" cy="4633874"/>
+            <a:off x="237656" y="2016182"/>
+            <a:ext cx="4277677" cy="5702504"/>
           </a:xfrm>
           <a:prstGeom prst="rect">
             <a:avLst/>
           </a:prstGeom>
         </p:spPr>
         <p:txBody>
-          <a:bodyPr vert="horz" lIns="84902" tIns="42450" rIns="84902" bIns="42450" rtlCol="0">
+          <a:bodyPr vert="horz" lIns="106809" tIns="53404" rIns="106809" bIns="53404" rtlCol="0">
             <a:normAutofit/>
           </a:bodyPr>
           <a:lstStyle/>
@@ -2697,18 +2697,18 @@
         </p:nvSpPr>
         <p:spPr>
           <a:xfrm>
-            <a:off x="192645" y="6507909"/>
-            <a:ext cx="899001" cy="373831"/>
+            <a:off x="237653" y="8008719"/>
+            <a:ext cx="1109027" cy="460041"/>
           </a:xfrm>
           <a:prstGeom prst="rect">
             <a:avLst/>
           </a:prstGeom>
         </p:spPr>
         <p:txBody>
-          <a:bodyPr vert="horz" lIns="84902" tIns="42450" rIns="84902" bIns="42450" rtlCol="0" anchor="ctr"/>
+          <a:bodyPr vert="horz" lIns="106809" tIns="53404" rIns="106809" bIns="53404" rtlCol="0" anchor="ctr"/>
           <a:lstStyle>
             <a:lvl1pPr algn="l">
-              <a:defRPr sz="1200">
+              <a:defRPr sz="1500">
                 <a:solidFill>
                   <a:schemeClr val="tx1">
                     <a:tint val="75000"/>
@@ -2720,7 +2720,7 @@
           <a:p>
             <a:fld id="{631F3B9D-D187-4196-BC59-C5BAE8C8D526}" type="datetimeFigureOut">
               <a:rPr lang="fr-FR" smtClean="0"/>
-              <a:t>29/06/2017</a:t>
+              <a:t>19/10/2017</a:t>
             </a:fld>
             <a:endParaRPr lang="fr-FR"/>
           </a:p>
@@ -2738,18 +2738,18 @@
         </p:nvSpPr>
         <p:spPr>
           <a:xfrm>
-            <a:off x="1316396" y="6507909"/>
-            <a:ext cx="1220074" cy="373831"/>
+            <a:off x="1623938" y="8008719"/>
+            <a:ext cx="1505109" cy="460041"/>
           </a:xfrm>
           <a:prstGeom prst="rect">
             <a:avLst/>
           </a:prstGeom>
         </p:spPr>
         <p:txBody>
-          <a:bodyPr vert="horz" lIns="84902" tIns="42450" rIns="84902" bIns="42450" rtlCol="0" anchor="ctr"/>
+          <a:bodyPr vert="horz" lIns="106809" tIns="53404" rIns="106809" bIns="53404" rtlCol="0" anchor="ctr"/>
           <a:lstStyle>
             <a:lvl1pPr algn="ctr">
-              <a:defRPr sz="1200">
+              <a:defRPr sz="1500">
                 <a:solidFill>
                   <a:schemeClr val="tx1">
                     <a:tint val="75000"/>
@@ -2775,18 +2775,18 @@
         </p:nvSpPr>
         <p:spPr>
           <a:xfrm>
-            <a:off x="2761220" y="6507909"/>
-            <a:ext cx="899001" cy="373831"/>
+            <a:off x="3406302" y="8008719"/>
+            <a:ext cx="1109027" cy="460041"/>
           </a:xfrm>
           <a:prstGeom prst="rect">
             <a:avLst/>
           </a:prstGeom>
         </p:spPr>
         <p:txBody>
-          <a:bodyPr vert="horz" lIns="84902" tIns="42450" rIns="84902" bIns="42450" rtlCol="0" anchor="ctr"/>
+          <a:bodyPr vert="horz" lIns="106809" tIns="53404" rIns="106809" bIns="53404" rtlCol="0" anchor="ctr"/>
           <a:lstStyle>
             <a:lvl1pPr algn="r">
-              <a:defRPr sz="1200">
+              <a:defRPr sz="1500">
                 <a:solidFill>
                   <a:schemeClr val="tx1">
                     <a:tint val="75000"/>
@@ -2827,12 +2827,12 @@
   </p:sldLayoutIdLst>
   <p:txStyles>
     <p:titleStyle>
-      <a:lvl1pPr algn="ctr" defTabSz="849021" rtl="0" eaLnBrk="1" latinLnBrk="0" hangingPunct="1">
+      <a:lvl1pPr algn="ctr" defTabSz="1068098" rtl="0" eaLnBrk="1" latinLnBrk="0" hangingPunct="1">
         <a:spcBef>
           <a:spcPct val="0"/>
         </a:spcBef>
         <a:buNone/>
-        <a:defRPr sz="4000" kern="1200">
+        <a:defRPr sz="5000" kern="1200">
           <a:solidFill>
             <a:schemeClr val="tx1"/>
           </a:solidFill>
@@ -2843,13 +2843,13 @@
       </a:lvl1pPr>
     </p:titleStyle>
     <p:bodyStyle>
-      <a:lvl1pPr marL="318383" indent="-318383" algn="l" defTabSz="849021" rtl="0" eaLnBrk="1" latinLnBrk="0" hangingPunct="1">
+      <a:lvl1pPr marL="400537" indent="-400537" algn="l" defTabSz="1068098" rtl="0" eaLnBrk="1" latinLnBrk="0" hangingPunct="1">
         <a:spcBef>
           <a:spcPct val="20000"/>
         </a:spcBef>
         <a:buFont typeface="Arial" pitchFamily="34" charset="0"/>
         <a:buChar char="•"/>
-        <a:defRPr sz="3100" kern="1200">
+        <a:defRPr sz="3900" kern="1200">
           <a:solidFill>
             <a:schemeClr val="tx1"/>
           </a:solidFill>
@@ -2858,12 +2858,27 @@
           <a:cs typeface="+mn-cs"/>
         </a:defRPr>
       </a:lvl1pPr>
-      <a:lvl2pPr marL="689829" indent="-265320" algn="l" defTabSz="849021" rtl="0" eaLnBrk="1" latinLnBrk="0" hangingPunct="1">
+      <a:lvl2pPr marL="867830" indent="-333782" algn="l" defTabSz="1068098" rtl="0" eaLnBrk="1" latinLnBrk="0" hangingPunct="1">
         <a:spcBef>
           <a:spcPct val="20000"/>
         </a:spcBef>
         <a:buFont typeface="Arial" pitchFamily="34" charset="0"/>
         <a:buChar char="–"/>
+        <a:defRPr sz="3400" kern="1200">
+          <a:solidFill>
+            <a:schemeClr val="tx1"/>
+          </a:solidFill>
+          <a:latin typeface="+mn-lt"/>
+          <a:ea typeface="+mn-ea"/>
+          <a:cs typeface="+mn-cs"/>
+        </a:defRPr>
+      </a:lvl2pPr>
+      <a:lvl3pPr marL="1335124" indent="-267026" algn="l" defTabSz="1068098" rtl="0" eaLnBrk="1" latinLnBrk="0" hangingPunct="1">
+        <a:spcBef>
+          <a:spcPct val="20000"/>
+        </a:spcBef>
+        <a:buFont typeface="Arial" pitchFamily="34" charset="0"/>
+        <a:buChar char="•"/>
         <a:defRPr sz="2700" kern="1200">
           <a:solidFill>
             <a:schemeClr val="tx1"/>
@@ -2872,29 +2887,14 @@
           <a:ea typeface="+mn-ea"/>
           <a:cs typeface="+mn-cs"/>
         </a:defRPr>
-      </a:lvl2pPr>
-      <a:lvl3pPr marL="1061277" indent="-212256" algn="l" defTabSz="849021" rtl="0" eaLnBrk="1" latinLnBrk="0" hangingPunct="1">
-        <a:spcBef>
-          <a:spcPct val="20000"/>
-        </a:spcBef>
-        <a:buFont typeface="Arial" pitchFamily="34" charset="0"/>
-        <a:buChar char="•"/>
-        <a:defRPr sz="2200" kern="1200">
-          <a:solidFill>
-            <a:schemeClr val="tx1"/>
-          </a:solidFill>
-          <a:latin typeface="+mn-lt"/>
-          <a:ea typeface="+mn-ea"/>
-          <a:cs typeface="+mn-cs"/>
-        </a:defRPr>
       </a:lvl3pPr>
-      <a:lvl4pPr marL="1485787" indent="-212256" algn="l" defTabSz="849021" rtl="0" eaLnBrk="1" latinLnBrk="0" hangingPunct="1">
+      <a:lvl4pPr marL="1869172" indent="-267026" algn="l" defTabSz="1068098" rtl="0" eaLnBrk="1" latinLnBrk="0" hangingPunct="1">
         <a:spcBef>
           <a:spcPct val="20000"/>
         </a:spcBef>
         <a:buFont typeface="Arial" pitchFamily="34" charset="0"/>
         <a:buChar char="–"/>
-        <a:defRPr sz="1800" kern="1200">
+        <a:defRPr sz="2300" kern="1200">
           <a:solidFill>
             <a:schemeClr val="tx1"/>
           </a:solidFill>
@@ -2903,13 +2903,13 @@
           <a:cs typeface="+mn-cs"/>
         </a:defRPr>
       </a:lvl4pPr>
-      <a:lvl5pPr marL="1910297" indent="-212256" algn="l" defTabSz="849021" rtl="0" eaLnBrk="1" latinLnBrk="0" hangingPunct="1">
+      <a:lvl5pPr marL="2403221" indent="-267026" algn="l" defTabSz="1068098" rtl="0" eaLnBrk="1" latinLnBrk="0" hangingPunct="1">
         <a:spcBef>
           <a:spcPct val="20000"/>
         </a:spcBef>
         <a:buFont typeface="Arial" pitchFamily="34" charset="0"/>
         <a:buChar char="»"/>
-        <a:defRPr sz="1800" kern="1200">
+        <a:defRPr sz="2300" kern="1200">
           <a:solidFill>
             <a:schemeClr val="tx1"/>
           </a:solidFill>
@@ -2918,13 +2918,13 @@
           <a:cs typeface="+mn-cs"/>
         </a:defRPr>
       </a:lvl5pPr>
-      <a:lvl6pPr marL="2334808" indent="-212256" algn="l" defTabSz="849021" rtl="0" eaLnBrk="1" latinLnBrk="0" hangingPunct="1">
+      <a:lvl6pPr marL="2937271" indent="-267026" algn="l" defTabSz="1068098" rtl="0" eaLnBrk="1" latinLnBrk="0" hangingPunct="1">
         <a:spcBef>
           <a:spcPct val="20000"/>
         </a:spcBef>
         <a:buFont typeface="Arial" pitchFamily="34" charset="0"/>
         <a:buChar char="•"/>
-        <a:defRPr sz="1800" kern="1200">
+        <a:defRPr sz="2300" kern="1200">
           <a:solidFill>
             <a:schemeClr val="tx1"/>
           </a:solidFill>
@@ -2933,13 +2933,13 @@
           <a:cs typeface="+mn-cs"/>
         </a:defRPr>
       </a:lvl6pPr>
-      <a:lvl7pPr marL="2759318" indent="-212256" algn="l" defTabSz="849021" rtl="0" eaLnBrk="1" latinLnBrk="0" hangingPunct="1">
+      <a:lvl7pPr marL="3471319" indent="-267026" algn="l" defTabSz="1068098" rtl="0" eaLnBrk="1" latinLnBrk="0" hangingPunct="1">
         <a:spcBef>
           <a:spcPct val="20000"/>
         </a:spcBef>
         <a:buFont typeface="Arial" pitchFamily="34" charset="0"/>
         <a:buChar char="•"/>
-        <a:defRPr sz="1800" kern="1200">
+        <a:defRPr sz="2300" kern="1200">
           <a:solidFill>
             <a:schemeClr val="tx1"/>
           </a:solidFill>
@@ -2948,13 +2948,13 @@
           <a:cs typeface="+mn-cs"/>
         </a:defRPr>
       </a:lvl7pPr>
-      <a:lvl8pPr marL="3183828" indent="-212256" algn="l" defTabSz="849021" rtl="0" eaLnBrk="1" latinLnBrk="0" hangingPunct="1">
+      <a:lvl8pPr marL="4005368" indent="-267026" algn="l" defTabSz="1068098" rtl="0" eaLnBrk="1" latinLnBrk="0" hangingPunct="1">
         <a:spcBef>
           <a:spcPct val="20000"/>
         </a:spcBef>
         <a:buFont typeface="Arial" pitchFamily="34" charset="0"/>
         <a:buChar char="•"/>
-        <a:defRPr sz="1800" kern="1200">
+        <a:defRPr sz="2300" kern="1200">
           <a:solidFill>
             <a:schemeClr val="tx1"/>
           </a:solidFill>
@@ -2963,13 +2963,13 @@
           <a:cs typeface="+mn-cs"/>
         </a:defRPr>
       </a:lvl8pPr>
-      <a:lvl9pPr marL="3608340" indent="-212256" algn="l" defTabSz="849021" rtl="0" eaLnBrk="1" latinLnBrk="0" hangingPunct="1">
+      <a:lvl9pPr marL="4539419" indent="-267026" algn="l" defTabSz="1068098" rtl="0" eaLnBrk="1" latinLnBrk="0" hangingPunct="1">
         <a:spcBef>
           <a:spcPct val="20000"/>
         </a:spcBef>
         <a:buFont typeface="Arial" pitchFamily="34" charset="0"/>
         <a:buChar char="•"/>
-        <a:defRPr sz="1800" kern="1200">
+        <a:defRPr sz="2300" kern="1200">
           <a:solidFill>
             <a:schemeClr val="tx1"/>
           </a:solidFill>
@@ -2983,8 +2983,8 @@
       <a:defPPr>
         <a:defRPr lang="fr-FR"/>
       </a:defPPr>
-      <a:lvl1pPr marL="0" algn="l" defTabSz="849021" rtl="0" eaLnBrk="1" latinLnBrk="0" hangingPunct="1">
-        <a:defRPr sz="1700" kern="1200">
+      <a:lvl1pPr marL="0" algn="l" defTabSz="1068098" rtl="0" eaLnBrk="1" latinLnBrk="0" hangingPunct="1">
+        <a:defRPr sz="2100" kern="1200">
           <a:solidFill>
             <a:schemeClr val="tx1"/>
           </a:solidFill>
@@ -2993,8 +2993,8 @@
           <a:cs typeface="+mn-cs"/>
         </a:defRPr>
       </a:lvl1pPr>
-      <a:lvl2pPr marL="424510" algn="l" defTabSz="849021" rtl="0" eaLnBrk="1" latinLnBrk="0" hangingPunct="1">
-        <a:defRPr sz="1700" kern="1200">
+      <a:lvl2pPr marL="534048" algn="l" defTabSz="1068098" rtl="0" eaLnBrk="1" latinLnBrk="0" hangingPunct="1">
+        <a:defRPr sz="2100" kern="1200">
           <a:solidFill>
             <a:schemeClr val="tx1"/>
           </a:solidFill>
@@ -3003,8 +3003,8 @@
           <a:cs typeface="+mn-cs"/>
         </a:defRPr>
       </a:lvl2pPr>
-      <a:lvl3pPr marL="849021" algn="l" defTabSz="849021" rtl="0" eaLnBrk="1" latinLnBrk="0" hangingPunct="1">
-        <a:defRPr sz="1700" kern="1200">
+      <a:lvl3pPr marL="1068098" algn="l" defTabSz="1068098" rtl="0" eaLnBrk="1" latinLnBrk="0" hangingPunct="1">
+        <a:defRPr sz="2100" kern="1200">
           <a:solidFill>
             <a:schemeClr val="tx1"/>
           </a:solidFill>
@@ -3013,8 +3013,8 @@
           <a:cs typeface="+mn-cs"/>
         </a:defRPr>
       </a:lvl3pPr>
-      <a:lvl4pPr marL="1273532" algn="l" defTabSz="849021" rtl="0" eaLnBrk="1" latinLnBrk="0" hangingPunct="1">
-        <a:defRPr sz="1700" kern="1200">
+      <a:lvl4pPr marL="1602148" algn="l" defTabSz="1068098" rtl="0" eaLnBrk="1" latinLnBrk="0" hangingPunct="1">
+        <a:defRPr sz="2100" kern="1200">
           <a:solidFill>
             <a:schemeClr val="tx1"/>
           </a:solidFill>
@@ -3023,8 +3023,8 @@
           <a:cs typeface="+mn-cs"/>
         </a:defRPr>
       </a:lvl4pPr>
-      <a:lvl5pPr marL="1698043" algn="l" defTabSz="849021" rtl="0" eaLnBrk="1" latinLnBrk="0" hangingPunct="1">
-        <a:defRPr sz="1700" kern="1200">
+      <a:lvl5pPr marL="2136198" algn="l" defTabSz="1068098" rtl="0" eaLnBrk="1" latinLnBrk="0" hangingPunct="1">
+        <a:defRPr sz="2100" kern="1200">
           <a:solidFill>
             <a:schemeClr val="tx1"/>
           </a:solidFill>
@@ -3033,8 +3033,8 @@
           <a:cs typeface="+mn-cs"/>
         </a:defRPr>
       </a:lvl5pPr>
-      <a:lvl6pPr marL="2122553" algn="l" defTabSz="849021" rtl="0" eaLnBrk="1" latinLnBrk="0" hangingPunct="1">
-        <a:defRPr sz="1700" kern="1200">
+      <a:lvl6pPr marL="2670246" algn="l" defTabSz="1068098" rtl="0" eaLnBrk="1" latinLnBrk="0" hangingPunct="1">
+        <a:defRPr sz="2100" kern="1200">
           <a:solidFill>
             <a:schemeClr val="tx1"/>
           </a:solidFill>
@@ -3043,8 +3043,8 @@
           <a:cs typeface="+mn-cs"/>
         </a:defRPr>
       </a:lvl6pPr>
-      <a:lvl7pPr marL="2547063" algn="l" defTabSz="849021" rtl="0" eaLnBrk="1" latinLnBrk="0" hangingPunct="1">
-        <a:defRPr sz="1700" kern="1200">
+      <a:lvl7pPr marL="3204295" algn="l" defTabSz="1068098" rtl="0" eaLnBrk="1" latinLnBrk="0" hangingPunct="1">
+        <a:defRPr sz="2100" kern="1200">
           <a:solidFill>
             <a:schemeClr val="tx1"/>
           </a:solidFill>
@@ -3053,8 +3053,8 @@
           <a:cs typeface="+mn-cs"/>
         </a:defRPr>
       </a:lvl7pPr>
-      <a:lvl8pPr marL="2971574" algn="l" defTabSz="849021" rtl="0" eaLnBrk="1" latinLnBrk="0" hangingPunct="1">
-        <a:defRPr sz="1700" kern="1200">
+      <a:lvl8pPr marL="3738345" algn="l" defTabSz="1068098" rtl="0" eaLnBrk="1" latinLnBrk="0" hangingPunct="1">
+        <a:defRPr sz="2100" kern="1200">
           <a:solidFill>
             <a:schemeClr val="tx1"/>
           </a:solidFill>
@@ -3063,8 +3063,8 @@
           <a:cs typeface="+mn-cs"/>
         </a:defRPr>
       </a:lvl8pPr>
-      <a:lvl9pPr marL="3396083" algn="l" defTabSz="849021" rtl="0" eaLnBrk="1" latinLnBrk="0" hangingPunct="1">
-        <a:defRPr sz="1700" kern="1200">
+      <a:lvl9pPr marL="4272393" algn="l" defTabSz="1068098" rtl="0" eaLnBrk="1" latinLnBrk="0" hangingPunct="1">
+        <a:defRPr sz="2100" kern="1200">
           <a:solidFill>
             <a:schemeClr val="tx1"/>
           </a:solidFill>
@@ -3097,7 +3097,7 @@
       </p:grpSpPr>
       <p:pic>
         <p:nvPicPr>
-          <p:cNvPr id="13" name="Picture 6"/>
+          <p:cNvPr id="4" name="Picture 3"/>
           <p:cNvPicPr>
             <a:picLocks noChangeAspect="1" noChangeArrowheads="1"/>
           </p:cNvPicPr>
@@ -3118,8 +3118,8 @@
         </p:blipFill>
         <p:spPr bwMode="auto">
           <a:xfrm>
-            <a:off x="-107851" y="-107950"/>
-            <a:ext cx="4230688" cy="7231062"/>
+            <a:off x="-161801" y="-233660"/>
+            <a:ext cx="5278438" cy="9028113"/>
           </a:xfrm>
           <a:prstGeom prst="rect">
             <a:avLst/>

</xml_diff>